<commit_message>
com design da pagina
</commit_message>
<xml_diff>
--- a/Entrega01.pptx
+++ b/Entrega01.pptx
@@ -1004,10 +1004,9 @@
         <a:lstStyle/>
         <a:p>
           <a:r>
-            <a:rPr lang="pt-BR" dirty="0" smtClean="0"/>
+            <a:rPr lang="pt-BR" dirty="0"/>
             <a:t>Estação meteorológica</a:t>
           </a:r>
-          <a:endParaRPr lang="pt-BR" dirty="0"/>
         </a:p>
       </dgm:t>
     </dgm:pt>
@@ -1077,10 +1076,9 @@
         <a:lstStyle/>
         <a:p>
           <a:r>
-            <a:rPr lang="pt-BR" dirty="0" smtClean="0"/>
+            <a:rPr lang="pt-BR" dirty="0"/>
             <a:t>Projetos de Design de software</a:t>
           </a:r>
-          <a:endParaRPr lang="pt-BR" dirty="0"/>
         </a:p>
       </dgm:t>
     </dgm:pt>
@@ -1186,10 +1184,9 @@
         <a:lstStyle/>
         <a:p>
           <a:r>
-            <a:rPr lang="pt-BR" dirty="0" smtClean="0"/>
+            <a:rPr lang="pt-BR" dirty="0"/>
             <a:t>Projetos de modelagem e simulação do mundo físico</a:t>
           </a:r>
-          <a:endParaRPr lang="pt-BR" dirty="0"/>
         </a:p>
       </dgm:t>
     </dgm:pt>
@@ -1226,10 +1223,9 @@
         </a:p>
         <a:p>
           <a:r>
-            <a:rPr lang="pt-BR" dirty="0" smtClean="0"/>
+            <a:rPr lang="pt-BR" dirty="0"/>
             <a:t>Projetos de Natureza do Design </a:t>
           </a:r>
-          <a:endParaRPr lang="pt-BR" dirty="0"/>
         </a:p>
       </dgm:t>
     </dgm:pt>
@@ -1552,13 +1548,6 @@
         </dgm:presLayoutVars>
       </dgm:prSet>
       <dgm:spPr/>
-      <dgm:t>
-        <a:bodyPr/>
-        <a:lstStyle/>
-        <a:p>
-          <a:endParaRPr lang="en-US"/>
-        </a:p>
-      </dgm:t>
     </dgm:pt>
     <dgm:pt modelId="{3A9E70BF-7173-410A-8CA4-4EDBD8E80E1D}" type="pres">
       <dgm:prSet presAssocID="{8245208F-8744-45B1-90A8-86D542F934F0}" presName="compNode" presStyleCnt="0"/>
@@ -1567,24 +1556,10 @@
     <dgm:pt modelId="{AEE58C13-6048-4E62-B43F-C028ED900B5B}" type="pres">
       <dgm:prSet presAssocID="{8245208F-8744-45B1-90A8-86D542F934F0}" presName="aNode" presStyleLbl="bgShp" presStyleIdx="0" presStyleCnt="5"/>
       <dgm:spPr/>
-      <dgm:t>
-        <a:bodyPr/>
-        <a:lstStyle/>
-        <a:p>
-          <a:endParaRPr lang="en-US"/>
-        </a:p>
-      </dgm:t>
     </dgm:pt>
     <dgm:pt modelId="{A696E25A-5CCD-438C-A29D-580FB0952415}" type="pres">
       <dgm:prSet presAssocID="{8245208F-8744-45B1-90A8-86D542F934F0}" presName="textNode" presStyleLbl="bgShp" presStyleIdx="0" presStyleCnt="5"/>
       <dgm:spPr/>
-      <dgm:t>
-        <a:bodyPr/>
-        <a:lstStyle/>
-        <a:p>
-          <a:endParaRPr lang="en-US"/>
-        </a:p>
-      </dgm:t>
     </dgm:pt>
     <dgm:pt modelId="{822E056C-107C-4E8A-906B-7945B3F314E2}" type="pres">
       <dgm:prSet presAssocID="{8245208F-8744-45B1-90A8-86D542F934F0}" presName="compChildNode" presStyleCnt="0"/>
@@ -1601,13 +1576,6 @@
         </dgm:presLayoutVars>
       </dgm:prSet>
       <dgm:spPr/>
-      <dgm:t>
-        <a:bodyPr/>
-        <a:lstStyle/>
-        <a:p>
-          <a:endParaRPr lang="en-US"/>
-        </a:p>
-      </dgm:t>
     </dgm:pt>
     <dgm:pt modelId="{EE06A540-5FB7-4132-8EAD-82CC3764E1B2}" type="pres">
       <dgm:prSet presAssocID="{DFD73739-77C3-4545-8AB8-A76A70172E1A}" presName="aSpace2" presStyleCnt="0"/>
@@ -1620,13 +1588,6 @@
         </dgm:presLayoutVars>
       </dgm:prSet>
       <dgm:spPr/>
-      <dgm:t>
-        <a:bodyPr/>
-        <a:lstStyle/>
-        <a:p>
-          <a:endParaRPr lang="en-US"/>
-        </a:p>
-      </dgm:t>
     </dgm:pt>
     <dgm:pt modelId="{A6C5C2E3-94F1-46B4-A92C-04E25F7D5A35}" type="pres">
       <dgm:prSet presAssocID="{A346E610-4B50-4C35-A53C-4D4B562F8F7D}" presName="aSpace2" presStyleCnt="0"/>
@@ -1639,13 +1600,6 @@
         </dgm:presLayoutVars>
       </dgm:prSet>
       <dgm:spPr/>
-      <dgm:t>
-        <a:bodyPr/>
-        <a:lstStyle/>
-        <a:p>
-          <a:endParaRPr lang="en-US"/>
-        </a:p>
-      </dgm:t>
     </dgm:pt>
     <dgm:pt modelId="{5E906463-C9C8-40EC-BC0C-F9B0B6FBA8B4}" type="pres">
       <dgm:prSet presAssocID="{A038BA8D-7FB9-4D06-9B3E-479A42691246}" presName="aSpace2" presStyleCnt="0"/>
@@ -1658,13 +1612,6 @@
         </dgm:presLayoutVars>
       </dgm:prSet>
       <dgm:spPr/>
-      <dgm:t>
-        <a:bodyPr/>
-        <a:lstStyle/>
-        <a:p>
-          <a:endParaRPr lang="en-US"/>
-        </a:p>
-      </dgm:t>
     </dgm:pt>
     <dgm:pt modelId="{EF65881E-B145-4FE3-95ED-798C49C5EBA3}" type="pres">
       <dgm:prSet presAssocID="{9AA20123-7343-4E8D-A493-AAE485CA554C}" presName="aSpace2" presStyleCnt="0"/>
@@ -1677,13 +1624,6 @@
         </dgm:presLayoutVars>
       </dgm:prSet>
       <dgm:spPr/>
-      <dgm:t>
-        <a:bodyPr/>
-        <a:lstStyle/>
-        <a:p>
-          <a:endParaRPr lang="en-US"/>
-        </a:p>
-      </dgm:t>
     </dgm:pt>
     <dgm:pt modelId="{70264612-D87C-48A7-BFC6-BE6E7FB9EA0C}" type="pres">
       <dgm:prSet presAssocID="{1D752428-DCAB-4F21-A008-8E12CC6FC7D3}" presName="aSpace2" presStyleCnt="0"/>
@@ -1696,13 +1636,6 @@
         </dgm:presLayoutVars>
       </dgm:prSet>
       <dgm:spPr/>
-      <dgm:t>
-        <a:bodyPr/>
-        <a:lstStyle/>
-        <a:p>
-          <a:endParaRPr lang="en-US"/>
-        </a:p>
-      </dgm:t>
     </dgm:pt>
     <dgm:pt modelId="{2BC21B3F-0DB2-46E5-B9C4-DFC6CABF3322}" type="pres">
       <dgm:prSet presAssocID="{E4D7E9A5-256B-4054-8AB8-C92525A8E1BA}" presName="aSpace2" presStyleCnt="0"/>
@@ -1715,13 +1648,6 @@
         </dgm:presLayoutVars>
       </dgm:prSet>
       <dgm:spPr/>
-      <dgm:t>
-        <a:bodyPr/>
-        <a:lstStyle/>
-        <a:p>
-          <a:endParaRPr lang="en-US"/>
-        </a:p>
-      </dgm:t>
     </dgm:pt>
     <dgm:pt modelId="{98EDF594-21CA-4981-B9E6-73617C315E58}" type="pres">
       <dgm:prSet presAssocID="{DEF2CF9F-D5BC-44B5-853B-D753DA6983D2}" presName="aSpace2" presStyleCnt="0"/>
@@ -1734,13 +1660,6 @@
         </dgm:presLayoutVars>
       </dgm:prSet>
       <dgm:spPr/>
-      <dgm:t>
-        <a:bodyPr/>
-        <a:lstStyle/>
-        <a:p>
-          <a:endParaRPr lang="en-US"/>
-        </a:p>
-      </dgm:t>
     </dgm:pt>
     <dgm:pt modelId="{5C2A8A8A-5923-41F1-97DC-738818C90164}" type="pres">
       <dgm:prSet presAssocID="{22AD4DF5-0D1D-4F9B-8854-657F5C3FD189}" presName="aSpace2" presStyleCnt="0"/>
@@ -1753,13 +1672,6 @@
         </dgm:presLayoutVars>
       </dgm:prSet>
       <dgm:spPr/>
-      <dgm:t>
-        <a:bodyPr/>
-        <a:lstStyle/>
-        <a:p>
-          <a:endParaRPr lang="en-US"/>
-        </a:p>
-      </dgm:t>
     </dgm:pt>
     <dgm:pt modelId="{FFA55D98-4678-4B75-9B2E-1A33030EE3F4}" type="pres">
       <dgm:prSet presAssocID="{8245208F-8744-45B1-90A8-86D542F934F0}" presName="aSpace" presStyleCnt="0"/>
@@ -1772,24 +1684,10 @@
     <dgm:pt modelId="{940ADE02-4FC1-4B39-9688-D31CDFE626F1}" type="pres">
       <dgm:prSet presAssocID="{6689905A-B81B-4A9C-ADBB-371B03968A79}" presName="aNode" presStyleLbl="bgShp" presStyleIdx="1" presStyleCnt="5"/>
       <dgm:spPr/>
-      <dgm:t>
-        <a:bodyPr/>
-        <a:lstStyle/>
-        <a:p>
-          <a:endParaRPr lang="en-US"/>
-        </a:p>
-      </dgm:t>
     </dgm:pt>
     <dgm:pt modelId="{F7BF947C-DE94-4185-B8D5-1B887DD85655}" type="pres">
       <dgm:prSet presAssocID="{6689905A-B81B-4A9C-ADBB-371B03968A79}" presName="textNode" presStyleLbl="bgShp" presStyleIdx="1" presStyleCnt="5"/>
       <dgm:spPr/>
-      <dgm:t>
-        <a:bodyPr/>
-        <a:lstStyle/>
-        <a:p>
-          <a:endParaRPr lang="en-US"/>
-        </a:p>
-      </dgm:t>
     </dgm:pt>
     <dgm:pt modelId="{ADBDBECB-55C8-4A64-B4BD-9CD2A0093F6C}" type="pres">
       <dgm:prSet presAssocID="{6689905A-B81B-4A9C-ADBB-371B03968A79}" presName="compChildNode" presStyleCnt="0"/>
@@ -1806,13 +1704,6 @@
         </dgm:presLayoutVars>
       </dgm:prSet>
       <dgm:spPr/>
-      <dgm:t>
-        <a:bodyPr/>
-        <a:lstStyle/>
-        <a:p>
-          <a:endParaRPr lang="en-US"/>
-        </a:p>
-      </dgm:t>
     </dgm:pt>
     <dgm:pt modelId="{08CDE2B9-26C6-478A-BE47-0E70CCFA352A}" type="pres">
       <dgm:prSet presAssocID="{6689905A-B81B-4A9C-ADBB-371B03968A79}" presName="aSpace" presStyleCnt="0"/>
@@ -1825,24 +1716,10 @@
     <dgm:pt modelId="{69D903DA-678E-454A-853F-76188B603A27}" type="pres">
       <dgm:prSet presAssocID="{12E2AACC-1F59-4249-A192-05E2DC555A22}" presName="aNode" presStyleLbl="bgShp" presStyleIdx="2" presStyleCnt="5"/>
       <dgm:spPr/>
-      <dgm:t>
-        <a:bodyPr/>
-        <a:lstStyle/>
-        <a:p>
-          <a:endParaRPr lang="en-US"/>
-        </a:p>
-      </dgm:t>
     </dgm:pt>
     <dgm:pt modelId="{CE75BE52-D6B0-4A53-AB05-903D27A161D3}" type="pres">
       <dgm:prSet presAssocID="{12E2AACC-1F59-4249-A192-05E2DC555A22}" presName="textNode" presStyleLbl="bgShp" presStyleIdx="2" presStyleCnt="5"/>
       <dgm:spPr/>
-      <dgm:t>
-        <a:bodyPr/>
-        <a:lstStyle/>
-        <a:p>
-          <a:endParaRPr lang="en-US"/>
-        </a:p>
-      </dgm:t>
     </dgm:pt>
     <dgm:pt modelId="{36627F9C-E08C-4F23-A9D8-F56B1C9D6B0A}" type="pres">
       <dgm:prSet presAssocID="{12E2AACC-1F59-4249-A192-05E2DC555A22}" presName="compChildNode" presStyleCnt="0"/>
@@ -1859,13 +1736,6 @@
         </dgm:presLayoutVars>
       </dgm:prSet>
       <dgm:spPr/>
-      <dgm:t>
-        <a:bodyPr/>
-        <a:lstStyle/>
-        <a:p>
-          <a:endParaRPr lang="en-US"/>
-        </a:p>
-      </dgm:t>
     </dgm:pt>
     <dgm:pt modelId="{0D9F53DD-0DD8-4A6C-A0A1-C6E386F78269}" type="pres">
       <dgm:prSet presAssocID="{12E2AACC-1F59-4249-A192-05E2DC555A22}" presName="aSpace" presStyleCnt="0"/>
@@ -1878,24 +1748,10 @@
     <dgm:pt modelId="{E19AFD89-7E0B-4B5C-90F8-927316EC7A98}" type="pres">
       <dgm:prSet presAssocID="{8E113AD3-1216-4868-873B-9A4AEC9A5003}" presName="aNode" presStyleLbl="bgShp" presStyleIdx="3" presStyleCnt="5"/>
       <dgm:spPr/>
-      <dgm:t>
-        <a:bodyPr/>
-        <a:lstStyle/>
-        <a:p>
-          <a:endParaRPr lang="en-US"/>
-        </a:p>
-      </dgm:t>
     </dgm:pt>
     <dgm:pt modelId="{7590E721-81C5-43FB-BE94-E6EDFD4F0405}" type="pres">
       <dgm:prSet presAssocID="{8E113AD3-1216-4868-873B-9A4AEC9A5003}" presName="textNode" presStyleLbl="bgShp" presStyleIdx="3" presStyleCnt="5"/>
       <dgm:spPr/>
-      <dgm:t>
-        <a:bodyPr/>
-        <a:lstStyle/>
-        <a:p>
-          <a:endParaRPr lang="en-US"/>
-        </a:p>
-      </dgm:t>
     </dgm:pt>
     <dgm:pt modelId="{63E76828-7EED-46CD-B096-E3EC54E075EB}" type="pres">
       <dgm:prSet presAssocID="{8E113AD3-1216-4868-873B-9A4AEC9A5003}" presName="compChildNode" presStyleCnt="0"/>
@@ -1912,13 +1768,6 @@
         </dgm:presLayoutVars>
       </dgm:prSet>
       <dgm:spPr/>
-      <dgm:t>
-        <a:bodyPr/>
-        <a:lstStyle/>
-        <a:p>
-          <a:endParaRPr lang="en-US"/>
-        </a:p>
-      </dgm:t>
     </dgm:pt>
     <dgm:pt modelId="{17D86695-58A1-41DE-BD95-803DC77DA7A9}" type="pres">
       <dgm:prSet presAssocID="{8E113AD3-1216-4868-873B-9A4AEC9A5003}" presName="aSpace" presStyleCnt="0"/>
@@ -1931,24 +1780,10 @@
     <dgm:pt modelId="{242A0A04-22A6-449A-84A7-3F921BA653A4}" type="pres">
       <dgm:prSet presAssocID="{0971B7E3-B3A7-42E3-94FC-9A076BDE9A0E}" presName="aNode" presStyleLbl="bgShp" presStyleIdx="4" presStyleCnt="5"/>
       <dgm:spPr/>
-      <dgm:t>
-        <a:bodyPr/>
-        <a:lstStyle/>
-        <a:p>
-          <a:endParaRPr lang="en-US"/>
-        </a:p>
-      </dgm:t>
     </dgm:pt>
     <dgm:pt modelId="{A0B514A6-4593-42F5-AC31-F1086A1EA4A3}" type="pres">
       <dgm:prSet presAssocID="{0971B7E3-B3A7-42E3-94FC-9A076BDE9A0E}" presName="textNode" presStyleLbl="bgShp" presStyleIdx="4" presStyleCnt="5"/>
       <dgm:spPr/>
-      <dgm:t>
-        <a:bodyPr/>
-        <a:lstStyle/>
-        <a:p>
-          <a:endParaRPr lang="en-US"/>
-        </a:p>
-      </dgm:t>
     </dgm:pt>
     <dgm:pt modelId="{11E2C0BC-B54A-4E2B-881D-5F8629981D60}" type="pres">
       <dgm:prSet presAssocID="{0971B7E3-B3A7-42E3-94FC-9A076BDE9A0E}" presName="compChildNode" presStyleCnt="0"/>
@@ -1965,58 +1800,51 @@
         </dgm:presLayoutVars>
       </dgm:prSet>
       <dgm:spPr/>
-      <dgm:t>
-        <a:bodyPr/>
-        <a:lstStyle/>
-        <a:p>
-          <a:endParaRPr lang="en-US"/>
-        </a:p>
-      </dgm:t>
     </dgm:pt>
   </dgm:ptLst>
   <dgm:cxnLst>
+    <dgm:cxn modelId="{5B0F7D25-8523-4694-947F-B55A1B34A55D}" type="presOf" srcId="{8E113AD3-1216-4868-873B-9A4AEC9A5003}" destId="{E19AFD89-7E0B-4B5C-90F8-927316EC7A98}" srcOrd="0" destOrd="0" presId="urn:microsoft.com/office/officeart/2005/8/layout/lProcess2"/>
+    <dgm:cxn modelId="{5D649825-FFCE-49E2-B94B-75E86403885D}" srcId="{8245208F-8744-45B1-90A8-86D542F934F0}" destId="{3B9C803D-2275-4C37-A939-594C67D18D27}" srcOrd="8" destOrd="0" parTransId="{ABD0A370-A39D-45DF-A0E9-F4FA73D9D077}" sibTransId="{C468D896-BBAF-4923-8398-E1582D8C56F1}"/>
+    <dgm:cxn modelId="{D0172A26-0A64-4112-8B91-E9CF310887E6}" type="presOf" srcId="{6689905A-B81B-4A9C-ADBB-371B03968A79}" destId="{940ADE02-4FC1-4B39-9688-D31CDFE626F1}" srcOrd="0" destOrd="0" presId="urn:microsoft.com/office/officeart/2005/8/layout/lProcess2"/>
+    <dgm:cxn modelId="{C6C5AF27-23C6-4A13-B28E-AAD9A4AE8AF7}" type="presOf" srcId="{3CAFF9C0-7808-4C47-939C-64AAF1E07C91}" destId="{14224C78-B157-401D-A2F1-E9F31649126E}" srcOrd="0" destOrd="0" presId="urn:microsoft.com/office/officeart/2005/8/layout/lProcess2"/>
+    <dgm:cxn modelId="{2C9B4D2C-5A40-461D-B3F7-0C03E89C71B0}" type="presOf" srcId="{8245208F-8744-45B1-90A8-86D542F934F0}" destId="{AEE58C13-6048-4E62-B43F-C028ED900B5B}" srcOrd="0" destOrd="0" presId="urn:microsoft.com/office/officeart/2005/8/layout/lProcess2"/>
+    <dgm:cxn modelId="{5F4D552F-FBC8-4DA2-B175-59C5112A886F}" type="presOf" srcId="{A346E610-4B50-4C35-A53C-4D4B562F8F7D}" destId="{8CA9BF7F-7A23-4F8E-81B3-A89FD1880B44}" srcOrd="0" destOrd="0" presId="urn:microsoft.com/office/officeart/2005/8/layout/lProcess2"/>
+    <dgm:cxn modelId="{42FCAE31-1D01-4FA7-B1A8-580107ACD759}" srcId="{3CAFF9C0-7808-4C47-939C-64AAF1E07C91}" destId="{8245208F-8744-45B1-90A8-86D542F934F0}" srcOrd="0" destOrd="0" parTransId="{BB7CFD95-BA32-47BB-A527-C2F09F0F6CC1}" sibTransId="{D47828CC-FFFA-4827-9897-B6C1FF4D4D42}"/>
+    <dgm:cxn modelId="{38E6B83D-B121-4655-819E-CD8ACE1D26A3}" srcId="{8E113AD3-1216-4868-873B-9A4AEC9A5003}" destId="{E3093668-ACCB-4CF7-8735-CD593E52646E}" srcOrd="0" destOrd="0" parTransId="{4B107640-A380-4F53-B8A9-741ED4724835}" sibTransId="{A7933CCE-385D-4DC6-BB05-10C157FCD40F}"/>
+    <dgm:cxn modelId="{00B4C344-F6D2-4C69-BE70-1C8F2477D105}" srcId="{12E2AACC-1F59-4249-A192-05E2DC555A22}" destId="{F9E9653E-7ECC-47A2-B46E-32803E632938}" srcOrd="0" destOrd="0" parTransId="{AD439863-1B85-435E-8BCC-D28C94900AAE}" sibTransId="{41AA59D9-CB41-4B70-B6D8-62B40A960139}"/>
+    <dgm:cxn modelId="{C0966A47-E587-4C94-9BC4-9BB1D89A3E91}" type="presOf" srcId="{8E113AD3-1216-4868-873B-9A4AEC9A5003}" destId="{7590E721-81C5-43FB-BE94-E6EDFD4F0405}" srcOrd="1" destOrd="0" presId="urn:microsoft.com/office/officeart/2005/8/layout/lProcess2"/>
+    <dgm:cxn modelId="{129C6D48-DD74-4EDC-90AA-BDC5FD24456B}" type="presOf" srcId="{F9E9653E-7ECC-47A2-B46E-32803E632938}" destId="{20A32166-6C01-4057-83F0-D3AE08205EDB}" srcOrd="0" destOrd="0" presId="urn:microsoft.com/office/officeart/2005/8/layout/lProcess2"/>
+    <dgm:cxn modelId="{910EB348-21FD-4776-BB42-286B8CDFA640}" srcId="{8245208F-8744-45B1-90A8-86D542F934F0}" destId="{1D752428-DCAB-4F21-A008-8E12CC6FC7D3}" srcOrd="4" destOrd="0" parTransId="{DD937F69-562B-4422-9E12-AA7FBD9AF231}" sibTransId="{74E2090F-C7D2-4D3A-AFC8-7FCE479BF486}"/>
+    <dgm:cxn modelId="{8B6F2C51-6A1C-4191-AB0E-094215517B5C}" type="presOf" srcId="{0971B7E3-B3A7-42E3-94FC-9A076BDE9A0E}" destId="{A0B514A6-4593-42F5-AC31-F1086A1EA4A3}" srcOrd="1" destOrd="0" presId="urn:microsoft.com/office/officeart/2005/8/layout/lProcess2"/>
+    <dgm:cxn modelId="{D5F1DA77-E8FB-4089-86F6-098A7AFF66A7}" srcId="{8245208F-8744-45B1-90A8-86D542F934F0}" destId="{9AA20123-7343-4E8D-A493-AAE485CA554C}" srcOrd="3" destOrd="0" parTransId="{965BF8CC-5258-482D-8AD5-5BB964A01A0E}" sibTransId="{76DE55F5-1F64-46C4-8B0E-65D58A55CE1B}"/>
+    <dgm:cxn modelId="{34601D7A-5B5F-44C6-B5DA-DF7C1BC8818F}" type="presOf" srcId="{DFD73739-77C3-4545-8AB8-A76A70172E1A}" destId="{B047C787-0676-42D9-B9A8-6E26DDE25859}" srcOrd="0" destOrd="0" presId="urn:microsoft.com/office/officeart/2005/8/layout/lProcess2"/>
     <dgm:cxn modelId="{118A027D-EB03-4B57-B640-38D51DDB9A0F}" type="presOf" srcId="{8245208F-8744-45B1-90A8-86D542F934F0}" destId="{A696E25A-5CCD-438C-A29D-580FB0952415}" srcOrd="1" destOrd="0" presId="urn:microsoft.com/office/officeart/2005/8/layout/lProcess2"/>
-    <dgm:cxn modelId="{2C9B4D2C-5A40-461D-B3F7-0C03E89C71B0}" type="presOf" srcId="{8245208F-8744-45B1-90A8-86D542F934F0}" destId="{AEE58C13-6048-4E62-B43F-C028ED900B5B}" srcOrd="0" destOrd="0" presId="urn:microsoft.com/office/officeart/2005/8/layout/lProcess2"/>
-    <dgm:cxn modelId="{5B0F7D25-8523-4694-947F-B55A1B34A55D}" type="presOf" srcId="{8E113AD3-1216-4868-873B-9A4AEC9A5003}" destId="{E19AFD89-7E0B-4B5C-90F8-927316EC7A98}" srcOrd="0" destOrd="0" presId="urn:microsoft.com/office/officeart/2005/8/layout/lProcess2"/>
-    <dgm:cxn modelId="{C0966A47-E587-4C94-9BC4-9BB1D89A3E91}" type="presOf" srcId="{8E113AD3-1216-4868-873B-9A4AEC9A5003}" destId="{7590E721-81C5-43FB-BE94-E6EDFD4F0405}" srcOrd="1" destOrd="0" presId="urn:microsoft.com/office/officeart/2005/8/layout/lProcess2"/>
-    <dgm:cxn modelId="{8B6F2C51-6A1C-4191-AB0E-094215517B5C}" type="presOf" srcId="{0971B7E3-B3A7-42E3-94FC-9A076BDE9A0E}" destId="{A0B514A6-4593-42F5-AC31-F1086A1EA4A3}" srcOrd="1" destOrd="0" presId="urn:microsoft.com/office/officeart/2005/8/layout/lProcess2"/>
+    <dgm:cxn modelId="{8BDC5B80-B577-4C50-B0A6-418FBDD534AA}" type="presOf" srcId="{810DEDB1-B4A6-4657-AF5E-AEB6410DD2D4}" destId="{1A444BC5-2F1A-4793-A8FB-134629D1C603}" srcOrd="0" destOrd="0" presId="urn:microsoft.com/office/officeart/2005/8/layout/lProcess2"/>
+    <dgm:cxn modelId="{FFA0B280-2229-40B6-B912-95138B9DC139}" srcId="{3CAFF9C0-7808-4C47-939C-64AAF1E07C91}" destId="{12E2AACC-1F59-4249-A192-05E2DC555A22}" srcOrd="2" destOrd="0" parTransId="{006E6F59-5EED-43A4-A9A2-EE03BBFAA026}" sibTransId="{0F2A16B6-D1FD-49C4-8EFD-192CA62DEB46}"/>
+    <dgm:cxn modelId="{64103084-9FA4-466D-ACF8-497002A527E5}" type="presOf" srcId="{0971B7E3-B3A7-42E3-94FC-9A076BDE9A0E}" destId="{242A0A04-22A6-449A-84A7-3F921BA653A4}" srcOrd="0" destOrd="0" presId="urn:microsoft.com/office/officeart/2005/8/layout/lProcess2"/>
+    <dgm:cxn modelId="{08CEDA90-8B8D-4328-BA1B-6D41FD3F070A}" srcId="{8245208F-8744-45B1-90A8-86D542F934F0}" destId="{DFD73739-77C3-4545-8AB8-A76A70172E1A}" srcOrd="0" destOrd="0" parTransId="{94D45ECA-C659-4583-B573-533D6A24436D}" sibTransId="{0507C284-AEC9-498C-9668-F6C0A709D6BC}"/>
+    <dgm:cxn modelId="{54C10E99-13CE-4074-BA8E-3A55B8075644}" type="presOf" srcId="{22AD4DF5-0D1D-4F9B-8854-657F5C3FD189}" destId="{1CE193FC-2184-4752-B0F6-9867416FDC88}" srcOrd="0" destOrd="0" presId="urn:microsoft.com/office/officeart/2005/8/layout/lProcess2"/>
+    <dgm:cxn modelId="{0D6DD59A-FCBF-4601-AC11-7567B2AACD68}" type="presOf" srcId="{3B9C803D-2275-4C37-A939-594C67D18D27}" destId="{59E920F4-5EAE-42D2-BE9D-9E4F2FF6B972}" srcOrd="0" destOrd="0" presId="urn:microsoft.com/office/officeart/2005/8/layout/lProcess2"/>
+    <dgm:cxn modelId="{10F0299B-0AA7-4C2D-BA43-64A99C82E37C}" srcId="{8245208F-8744-45B1-90A8-86D542F934F0}" destId="{A038BA8D-7FB9-4D06-9B3E-479A42691246}" srcOrd="2" destOrd="0" parTransId="{EA181C66-DDD9-47BB-AD4D-18D0FF700DB7}" sibTransId="{0B3ADF94-9728-4D36-8877-8FA814E47791}"/>
+    <dgm:cxn modelId="{7121BE9B-F4EE-497F-8096-3439D7F75581}" srcId="{8245208F-8744-45B1-90A8-86D542F934F0}" destId="{A346E610-4B50-4C35-A53C-4D4B562F8F7D}" srcOrd="1" destOrd="0" parTransId="{136DE74A-A0A2-4B79-BF21-373EA1B95942}" sibTransId="{9272514F-2195-40F0-A443-206EA70F9EBC}"/>
+    <dgm:cxn modelId="{439E429E-7F8C-4BCF-95D9-1CEB6BE19EFF}" type="presOf" srcId="{6689905A-B81B-4A9C-ADBB-371B03968A79}" destId="{F7BF947C-DE94-4185-B8D5-1B887DD85655}" srcOrd="1" destOrd="0" presId="urn:microsoft.com/office/officeart/2005/8/layout/lProcess2"/>
+    <dgm:cxn modelId="{B2E6ADA0-39D1-4698-AFC7-61CFAAE14AD1}" type="presOf" srcId="{BDA7F26E-7E77-405E-975F-1070EEAB3DB0}" destId="{BFF188C1-7662-4B3E-9D46-7581EFAB0185}" srcOrd="0" destOrd="0" presId="urn:microsoft.com/office/officeart/2005/8/layout/lProcess2"/>
+    <dgm:cxn modelId="{7CFE9AA9-A5F8-4FC6-9F75-99CFAE09A3CC}" srcId="{0971B7E3-B3A7-42E3-94FC-9A076BDE9A0E}" destId="{BDA7F26E-7E77-405E-975F-1070EEAB3DB0}" srcOrd="0" destOrd="0" parTransId="{288E92CD-A59F-4380-910C-D726186094BB}" sibTransId="{5B0C8D36-FA47-4FDC-A5BB-F01D422468BA}"/>
+    <dgm:cxn modelId="{2C8ABBB1-AE87-45FA-999F-4C4ACEA17256}" srcId="{8245208F-8744-45B1-90A8-86D542F934F0}" destId="{22AD4DF5-0D1D-4F9B-8854-657F5C3FD189}" srcOrd="7" destOrd="0" parTransId="{86296D2D-E6B3-4051-AFCA-FD8A42E6AA47}" sibTransId="{0363C917-DEE0-4959-8EE6-F5BB31DD99EC}"/>
+    <dgm:cxn modelId="{B12B9ABD-BAF3-458C-834F-969174931EAE}" type="presOf" srcId="{1D752428-DCAB-4F21-A008-8E12CC6FC7D3}" destId="{074C6656-C63B-468B-AFA7-4B1B0308D8AC}" srcOrd="0" destOrd="0" presId="urn:microsoft.com/office/officeart/2005/8/layout/lProcess2"/>
+    <dgm:cxn modelId="{B6355EC4-E6B4-44BB-9977-339980CBB59A}" type="presOf" srcId="{9AA20123-7343-4E8D-A493-AAE485CA554C}" destId="{637897D9-A3C8-4C94-A5FC-AD4263F06254}" srcOrd="0" destOrd="0" presId="urn:microsoft.com/office/officeart/2005/8/layout/lProcess2"/>
+    <dgm:cxn modelId="{0A8665C5-3703-493B-AD5B-D8E9E1C980DF}" srcId="{8245208F-8744-45B1-90A8-86D542F934F0}" destId="{DEF2CF9F-D5BC-44B5-853B-D753DA6983D2}" srcOrd="6" destOrd="0" parTransId="{B0B9FA12-F05C-4A04-8F49-E111D10320A6}" sibTransId="{583FEE7F-BEA7-42E8-A459-3F80B9E8E86F}"/>
+    <dgm:cxn modelId="{101CFBD0-8D48-4E94-844A-886E2D685F0D}" type="presOf" srcId="{12E2AACC-1F59-4249-A192-05E2DC555A22}" destId="{69D903DA-678E-454A-853F-76188B603A27}" srcOrd="0" destOrd="0" presId="urn:microsoft.com/office/officeart/2005/8/layout/lProcess2"/>
+    <dgm:cxn modelId="{79099BD6-51BB-4963-B906-EF894535D088}" type="presOf" srcId="{E3093668-ACCB-4CF7-8735-CD593E52646E}" destId="{A11843C8-BE16-4AFC-B7F5-C82431E17162}" srcOrd="0" destOrd="0" presId="urn:microsoft.com/office/officeart/2005/8/layout/lProcess2"/>
+    <dgm:cxn modelId="{60FA62D8-EA4E-4132-93CD-28557B9E1D83}" srcId="{8245208F-8744-45B1-90A8-86D542F934F0}" destId="{E4D7E9A5-256B-4054-8AB8-C92525A8E1BA}" srcOrd="5" destOrd="0" parTransId="{19233E0D-925C-4F7F-9CB9-D05314F988D7}" sibTransId="{D8FB6C80-42DA-4570-9897-70660379C363}"/>
+    <dgm:cxn modelId="{1A689FD8-A66A-4DA0-9F02-7895624B3DE9}" srcId="{3CAFF9C0-7808-4C47-939C-64AAF1E07C91}" destId="{6689905A-B81B-4A9C-ADBB-371B03968A79}" srcOrd="1" destOrd="0" parTransId="{DE1834AF-5EF9-4FCF-B077-CF1E048A284B}" sibTransId="{0B8E98A9-9E65-431B-9F5B-390A1868D601}"/>
+    <dgm:cxn modelId="{055BFBD9-6A3C-44BB-A0B3-26260D52EC96}" srcId="{3CAFF9C0-7808-4C47-939C-64AAF1E07C91}" destId="{0971B7E3-B3A7-42E3-94FC-9A076BDE9A0E}" srcOrd="4" destOrd="0" parTransId="{CBA56312-7894-4941-A6E1-19DE59DE1BA7}" sibTransId="{B5F24B20-3BDA-49CB-B469-BDB58211B1AF}"/>
+    <dgm:cxn modelId="{82A85FEA-3F90-422F-A33D-BF2D8B0C3923}" srcId="{6689905A-B81B-4A9C-ADBB-371B03968A79}" destId="{810DEDB1-B4A6-4657-AF5E-AEB6410DD2D4}" srcOrd="0" destOrd="0" parTransId="{98292DC3-5B58-4215-A404-911D28DF38D9}" sibTransId="{86BE4BA9-58AD-4313-BD68-9B836E45986E}"/>
+    <dgm:cxn modelId="{747828ED-1547-48EA-AB7A-1FA207522075}" type="presOf" srcId="{12E2AACC-1F59-4249-A192-05E2DC555A22}" destId="{CE75BE52-D6B0-4A53-AB05-903D27A161D3}" srcOrd="1" destOrd="0" presId="urn:microsoft.com/office/officeart/2005/8/layout/lProcess2"/>
     <dgm:cxn modelId="{7662F9F0-C9B1-4C7E-86CA-F5DE78E351CA}" srcId="{3CAFF9C0-7808-4C47-939C-64AAF1E07C91}" destId="{8E113AD3-1216-4868-873B-9A4AEC9A5003}" srcOrd="3" destOrd="0" parTransId="{E3BD1BF2-D113-43EF-A8B2-FD4394032B33}" sibTransId="{6E0B25E6-6827-445D-BED7-8FFA09FEF3BC}"/>
-    <dgm:cxn modelId="{2C8ABBB1-AE87-45FA-999F-4C4ACEA17256}" srcId="{8245208F-8744-45B1-90A8-86D542F934F0}" destId="{22AD4DF5-0D1D-4F9B-8854-657F5C3FD189}" srcOrd="7" destOrd="0" parTransId="{86296D2D-E6B3-4051-AFCA-FD8A42E6AA47}" sibTransId="{0363C917-DEE0-4959-8EE6-F5BB31DD99EC}"/>
-    <dgm:cxn modelId="{C6C5AF27-23C6-4A13-B28E-AAD9A4AE8AF7}" type="presOf" srcId="{3CAFF9C0-7808-4C47-939C-64AAF1E07C91}" destId="{14224C78-B157-401D-A2F1-E9F31649126E}" srcOrd="0" destOrd="0" presId="urn:microsoft.com/office/officeart/2005/8/layout/lProcess2"/>
-    <dgm:cxn modelId="{54C10E99-13CE-4074-BA8E-3A55B8075644}" type="presOf" srcId="{22AD4DF5-0D1D-4F9B-8854-657F5C3FD189}" destId="{1CE193FC-2184-4752-B0F6-9867416FDC88}" srcOrd="0" destOrd="0" presId="urn:microsoft.com/office/officeart/2005/8/layout/lProcess2"/>
-    <dgm:cxn modelId="{5F4D552F-FBC8-4DA2-B175-59C5112A886F}" type="presOf" srcId="{A346E610-4B50-4C35-A53C-4D4B562F8F7D}" destId="{8CA9BF7F-7A23-4F8E-81B3-A89FD1880B44}" srcOrd="0" destOrd="0" presId="urn:microsoft.com/office/officeart/2005/8/layout/lProcess2"/>
-    <dgm:cxn modelId="{08CEDA90-8B8D-4328-BA1B-6D41FD3F070A}" srcId="{8245208F-8744-45B1-90A8-86D542F934F0}" destId="{DFD73739-77C3-4545-8AB8-A76A70172E1A}" srcOrd="0" destOrd="0" parTransId="{94D45ECA-C659-4583-B573-533D6A24436D}" sibTransId="{0507C284-AEC9-498C-9668-F6C0A709D6BC}"/>
-    <dgm:cxn modelId="{B6355EC4-E6B4-44BB-9977-339980CBB59A}" type="presOf" srcId="{9AA20123-7343-4E8D-A493-AAE485CA554C}" destId="{637897D9-A3C8-4C94-A5FC-AD4263F06254}" srcOrd="0" destOrd="0" presId="urn:microsoft.com/office/officeart/2005/8/layout/lProcess2"/>
-    <dgm:cxn modelId="{0D6DD59A-FCBF-4601-AC11-7567B2AACD68}" type="presOf" srcId="{3B9C803D-2275-4C37-A939-594C67D18D27}" destId="{59E920F4-5EAE-42D2-BE9D-9E4F2FF6B972}" srcOrd="0" destOrd="0" presId="urn:microsoft.com/office/officeart/2005/8/layout/lProcess2"/>
-    <dgm:cxn modelId="{42FCAE31-1D01-4FA7-B1A8-580107ACD759}" srcId="{3CAFF9C0-7808-4C47-939C-64AAF1E07C91}" destId="{8245208F-8744-45B1-90A8-86D542F934F0}" srcOrd="0" destOrd="0" parTransId="{BB7CFD95-BA32-47BB-A527-C2F09F0F6CC1}" sibTransId="{D47828CC-FFFA-4827-9897-B6C1FF4D4D42}"/>
-    <dgm:cxn modelId="{910EB348-21FD-4776-BB42-286B8CDFA640}" srcId="{8245208F-8744-45B1-90A8-86D542F934F0}" destId="{1D752428-DCAB-4F21-A008-8E12CC6FC7D3}" srcOrd="4" destOrd="0" parTransId="{DD937F69-562B-4422-9E12-AA7FBD9AF231}" sibTransId="{74E2090F-C7D2-4D3A-AFC8-7FCE479BF486}"/>
-    <dgm:cxn modelId="{B2E6ADA0-39D1-4698-AFC7-61CFAAE14AD1}" type="presOf" srcId="{BDA7F26E-7E77-405E-975F-1070EEAB3DB0}" destId="{BFF188C1-7662-4B3E-9D46-7581EFAB0185}" srcOrd="0" destOrd="0" presId="urn:microsoft.com/office/officeart/2005/8/layout/lProcess2"/>
-    <dgm:cxn modelId="{D5F1DA77-E8FB-4089-86F6-098A7AFF66A7}" srcId="{8245208F-8744-45B1-90A8-86D542F934F0}" destId="{9AA20123-7343-4E8D-A493-AAE485CA554C}" srcOrd="3" destOrd="0" parTransId="{965BF8CC-5258-482D-8AD5-5BB964A01A0E}" sibTransId="{76DE55F5-1F64-46C4-8B0E-65D58A55CE1B}"/>
+    <dgm:cxn modelId="{EF6152F4-6AED-4462-94AE-966727C80A53}" type="presOf" srcId="{E4D7E9A5-256B-4054-8AB8-C92525A8E1BA}" destId="{BA10DB4B-8624-4AD3-A9A1-A24A60E86BD4}" srcOrd="0" destOrd="0" presId="urn:microsoft.com/office/officeart/2005/8/layout/lProcess2"/>
+    <dgm:cxn modelId="{36DD07FF-CDB9-4771-8926-C9E4BB6DBFF7}" type="presOf" srcId="{A038BA8D-7FB9-4D06-9B3E-479A42691246}" destId="{DC493DA2-5315-4C52-94D0-4FE2628ED80E}" srcOrd="0" destOrd="0" presId="urn:microsoft.com/office/officeart/2005/8/layout/lProcess2"/>
     <dgm:cxn modelId="{D93E44FF-2B58-4623-AC32-002987C647A1}" type="presOf" srcId="{DEF2CF9F-D5BC-44B5-853B-D753DA6983D2}" destId="{3DECD127-3C94-4A15-BB5B-E326A3EBF2BA}" srcOrd="0" destOrd="0" presId="urn:microsoft.com/office/officeart/2005/8/layout/lProcess2"/>
-    <dgm:cxn modelId="{60FA62D8-EA4E-4132-93CD-28557B9E1D83}" srcId="{8245208F-8744-45B1-90A8-86D542F934F0}" destId="{E4D7E9A5-256B-4054-8AB8-C92525A8E1BA}" srcOrd="5" destOrd="0" parTransId="{19233E0D-925C-4F7F-9CB9-D05314F988D7}" sibTransId="{D8FB6C80-42DA-4570-9897-70660379C363}"/>
-    <dgm:cxn modelId="{7CFE9AA9-A5F8-4FC6-9F75-99CFAE09A3CC}" srcId="{0971B7E3-B3A7-42E3-94FC-9A076BDE9A0E}" destId="{BDA7F26E-7E77-405E-975F-1070EEAB3DB0}" srcOrd="0" destOrd="0" parTransId="{288E92CD-A59F-4380-910C-D726186094BB}" sibTransId="{5B0C8D36-FA47-4FDC-A5BB-F01D422468BA}"/>
-    <dgm:cxn modelId="{7121BE9B-F4EE-497F-8096-3439D7F75581}" srcId="{8245208F-8744-45B1-90A8-86D542F934F0}" destId="{A346E610-4B50-4C35-A53C-4D4B562F8F7D}" srcOrd="1" destOrd="0" parTransId="{136DE74A-A0A2-4B79-BF21-373EA1B95942}" sibTransId="{9272514F-2195-40F0-A443-206EA70F9EBC}"/>
-    <dgm:cxn modelId="{D0172A26-0A64-4112-8B91-E9CF310887E6}" type="presOf" srcId="{6689905A-B81B-4A9C-ADBB-371B03968A79}" destId="{940ADE02-4FC1-4B39-9688-D31CDFE626F1}" srcOrd="0" destOrd="0" presId="urn:microsoft.com/office/officeart/2005/8/layout/lProcess2"/>
-    <dgm:cxn modelId="{34601D7A-5B5F-44C6-B5DA-DF7C1BC8818F}" type="presOf" srcId="{DFD73739-77C3-4545-8AB8-A76A70172E1A}" destId="{B047C787-0676-42D9-B9A8-6E26DDE25859}" srcOrd="0" destOrd="0" presId="urn:microsoft.com/office/officeart/2005/8/layout/lProcess2"/>
-    <dgm:cxn modelId="{82A85FEA-3F90-422F-A33D-BF2D8B0C3923}" srcId="{6689905A-B81B-4A9C-ADBB-371B03968A79}" destId="{810DEDB1-B4A6-4657-AF5E-AEB6410DD2D4}" srcOrd="0" destOrd="0" parTransId="{98292DC3-5B58-4215-A404-911D28DF38D9}" sibTransId="{86BE4BA9-58AD-4313-BD68-9B836E45986E}"/>
-    <dgm:cxn modelId="{38E6B83D-B121-4655-819E-CD8ACE1D26A3}" srcId="{8E113AD3-1216-4868-873B-9A4AEC9A5003}" destId="{E3093668-ACCB-4CF7-8735-CD593E52646E}" srcOrd="0" destOrd="0" parTransId="{4B107640-A380-4F53-B8A9-741ED4724835}" sibTransId="{A7933CCE-385D-4DC6-BB05-10C157FCD40F}"/>
-    <dgm:cxn modelId="{101CFBD0-8D48-4E94-844A-886E2D685F0D}" type="presOf" srcId="{12E2AACC-1F59-4249-A192-05E2DC555A22}" destId="{69D903DA-678E-454A-853F-76188B603A27}" srcOrd="0" destOrd="0" presId="urn:microsoft.com/office/officeart/2005/8/layout/lProcess2"/>
-    <dgm:cxn modelId="{00B4C344-F6D2-4C69-BE70-1C8F2477D105}" srcId="{12E2AACC-1F59-4249-A192-05E2DC555A22}" destId="{F9E9653E-7ECC-47A2-B46E-32803E632938}" srcOrd="0" destOrd="0" parTransId="{AD439863-1B85-435E-8BCC-D28C94900AAE}" sibTransId="{41AA59D9-CB41-4B70-B6D8-62B40A960139}"/>
-    <dgm:cxn modelId="{1A689FD8-A66A-4DA0-9F02-7895624B3DE9}" srcId="{3CAFF9C0-7808-4C47-939C-64AAF1E07C91}" destId="{6689905A-B81B-4A9C-ADBB-371B03968A79}" srcOrd="1" destOrd="0" parTransId="{DE1834AF-5EF9-4FCF-B077-CF1E048A284B}" sibTransId="{0B8E98A9-9E65-431B-9F5B-390A1868D601}"/>
-    <dgm:cxn modelId="{129C6D48-DD74-4EDC-90AA-BDC5FD24456B}" type="presOf" srcId="{F9E9653E-7ECC-47A2-B46E-32803E632938}" destId="{20A32166-6C01-4057-83F0-D3AE08205EDB}" srcOrd="0" destOrd="0" presId="urn:microsoft.com/office/officeart/2005/8/layout/lProcess2"/>
-    <dgm:cxn modelId="{FFA0B280-2229-40B6-B912-95138B9DC139}" srcId="{3CAFF9C0-7808-4C47-939C-64AAF1E07C91}" destId="{12E2AACC-1F59-4249-A192-05E2DC555A22}" srcOrd="2" destOrd="0" parTransId="{006E6F59-5EED-43A4-A9A2-EE03BBFAA026}" sibTransId="{0F2A16B6-D1FD-49C4-8EFD-192CA62DEB46}"/>
-    <dgm:cxn modelId="{439E429E-7F8C-4BCF-95D9-1CEB6BE19EFF}" type="presOf" srcId="{6689905A-B81B-4A9C-ADBB-371B03968A79}" destId="{F7BF947C-DE94-4185-B8D5-1B887DD85655}" srcOrd="1" destOrd="0" presId="urn:microsoft.com/office/officeart/2005/8/layout/lProcess2"/>
-    <dgm:cxn modelId="{0A8665C5-3703-493B-AD5B-D8E9E1C980DF}" srcId="{8245208F-8744-45B1-90A8-86D542F934F0}" destId="{DEF2CF9F-D5BC-44B5-853B-D753DA6983D2}" srcOrd="6" destOrd="0" parTransId="{B0B9FA12-F05C-4A04-8F49-E111D10320A6}" sibTransId="{583FEE7F-BEA7-42E8-A459-3F80B9E8E86F}"/>
-    <dgm:cxn modelId="{36DD07FF-CDB9-4771-8926-C9E4BB6DBFF7}" type="presOf" srcId="{A038BA8D-7FB9-4D06-9B3E-479A42691246}" destId="{DC493DA2-5315-4C52-94D0-4FE2628ED80E}" srcOrd="0" destOrd="0" presId="urn:microsoft.com/office/officeart/2005/8/layout/lProcess2"/>
-    <dgm:cxn modelId="{10F0299B-0AA7-4C2D-BA43-64A99C82E37C}" srcId="{8245208F-8744-45B1-90A8-86D542F934F0}" destId="{A038BA8D-7FB9-4D06-9B3E-479A42691246}" srcOrd="2" destOrd="0" parTransId="{EA181C66-DDD9-47BB-AD4D-18D0FF700DB7}" sibTransId="{0B3ADF94-9728-4D36-8877-8FA814E47791}"/>
-    <dgm:cxn modelId="{055BFBD9-6A3C-44BB-A0B3-26260D52EC96}" srcId="{3CAFF9C0-7808-4C47-939C-64AAF1E07C91}" destId="{0971B7E3-B3A7-42E3-94FC-9A076BDE9A0E}" srcOrd="4" destOrd="0" parTransId="{CBA56312-7894-4941-A6E1-19DE59DE1BA7}" sibTransId="{B5F24B20-3BDA-49CB-B469-BDB58211B1AF}"/>
-    <dgm:cxn modelId="{5D649825-FFCE-49E2-B94B-75E86403885D}" srcId="{8245208F-8744-45B1-90A8-86D542F934F0}" destId="{3B9C803D-2275-4C37-A939-594C67D18D27}" srcOrd="8" destOrd="0" parTransId="{ABD0A370-A39D-45DF-A0E9-F4FA73D9D077}" sibTransId="{C468D896-BBAF-4923-8398-E1582D8C56F1}"/>
-    <dgm:cxn modelId="{EF6152F4-6AED-4462-94AE-966727C80A53}" type="presOf" srcId="{E4D7E9A5-256B-4054-8AB8-C92525A8E1BA}" destId="{BA10DB4B-8624-4AD3-A9A1-A24A60E86BD4}" srcOrd="0" destOrd="0" presId="urn:microsoft.com/office/officeart/2005/8/layout/lProcess2"/>
-    <dgm:cxn modelId="{B12B9ABD-BAF3-458C-834F-969174931EAE}" type="presOf" srcId="{1D752428-DCAB-4F21-A008-8E12CC6FC7D3}" destId="{074C6656-C63B-468B-AFA7-4B1B0308D8AC}" srcOrd="0" destOrd="0" presId="urn:microsoft.com/office/officeart/2005/8/layout/lProcess2"/>
-    <dgm:cxn modelId="{747828ED-1547-48EA-AB7A-1FA207522075}" type="presOf" srcId="{12E2AACC-1F59-4249-A192-05E2DC555A22}" destId="{CE75BE52-D6B0-4A53-AB05-903D27A161D3}" srcOrd="1" destOrd="0" presId="urn:microsoft.com/office/officeart/2005/8/layout/lProcess2"/>
-    <dgm:cxn modelId="{79099BD6-51BB-4963-B906-EF894535D088}" type="presOf" srcId="{E3093668-ACCB-4CF7-8735-CD593E52646E}" destId="{A11843C8-BE16-4AFC-B7F5-C82431E17162}" srcOrd="0" destOrd="0" presId="urn:microsoft.com/office/officeart/2005/8/layout/lProcess2"/>
-    <dgm:cxn modelId="{64103084-9FA4-466D-ACF8-497002A527E5}" type="presOf" srcId="{0971B7E3-B3A7-42E3-94FC-9A076BDE9A0E}" destId="{242A0A04-22A6-449A-84A7-3F921BA653A4}" srcOrd="0" destOrd="0" presId="urn:microsoft.com/office/officeart/2005/8/layout/lProcess2"/>
-    <dgm:cxn modelId="{8BDC5B80-B577-4C50-B0A6-418FBDD534AA}" type="presOf" srcId="{810DEDB1-B4A6-4657-AF5E-AEB6410DD2D4}" destId="{1A444BC5-2F1A-4793-A8FB-134629D1C603}" srcOrd="0" destOrd="0" presId="urn:microsoft.com/office/officeart/2005/8/layout/lProcess2"/>
     <dgm:cxn modelId="{FF97D039-BC7B-44EF-B3ED-C642CFF69D11}" type="presParOf" srcId="{14224C78-B157-401D-A2F1-E9F31649126E}" destId="{3A9E70BF-7173-410A-8CA4-4EDBD8E80E1D}" srcOrd="0" destOrd="0" presId="urn:microsoft.com/office/officeart/2005/8/layout/lProcess2"/>
     <dgm:cxn modelId="{9887312C-AAE8-42D4-B6EC-B3DA05FC811A}" type="presParOf" srcId="{3A9E70BF-7173-410A-8CA4-4EDBD8E80E1D}" destId="{AEE58C13-6048-4E62-B43F-C028ED900B5B}" srcOrd="0" destOrd="0" presId="urn:microsoft.com/office/officeart/2005/8/layout/lProcess2"/>
     <dgm:cxn modelId="{00D317CF-6834-40C6-BF4C-995753AD53AE}" type="presParOf" srcId="{3A9E70BF-7173-410A-8CA4-4EDBD8E80E1D}" destId="{A696E25A-5CCD-438C-A29D-580FB0952415}" srcOrd="1" destOrd="0" presId="urn:microsoft.com/office/officeart/2005/8/layout/lProcess2"/>
@@ -2133,7 +1961,7 @@
         </a:bodyPr>
         <a:lstStyle/>
         <a:p>
-          <a:pPr lvl="0" algn="ctr" defTabSz="711200">
+          <a:pPr marL="0" lvl="0" indent="0" algn="ctr" defTabSz="711200">
             <a:lnSpc>
               <a:spcPct val="90000"/>
             </a:lnSpc>
@@ -2143,6 +1971,7 @@
             <a:spcAft>
               <a:spcPct val="35000"/>
             </a:spcAft>
+            <a:buNone/>
           </a:pPr>
           <a:r>
             <a:rPr lang="pt-BR" sz="1600" kern="1200" dirty="0"/>
@@ -2212,7 +2041,7 @@
         </a:bodyPr>
         <a:lstStyle/>
         <a:p>
-          <a:pPr lvl="0" algn="ctr" defTabSz="622300">
+          <a:pPr marL="0" lvl="0" indent="0" algn="ctr" defTabSz="622300">
             <a:lnSpc>
               <a:spcPct val="90000"/>
             </a:lnSpc>
@@ -2222,6 +2051,7 @@
             <a:spcAft>
               <a:spcPct val="35000"/>
             </a:spcAft>
+            <a:buNone/>
           </a:pPr>
           <a:r>
             <a:rPr lang="pt-BR" sz="1400" kern="1200" dirty="0"/>
@@ -2291,7 +2121,7 @@
         </a:bodyPr>
         <a:lstStyle/>
         <a:p>
-          <a:pPr lvl="0" algn="ctr" defTabSz="622300">
+          <a:pPr marL="0" lvl="0" indent="0" algn="ctr" defTabSz="622300">
             <a:lnSpc>
               <a:spcPct val="90000"/>
             </a:lnSpc>
@@ -2301,6 +2131,7 @@
             <a:spcAft>
               <a:spcPct val="35000"/>
             </a:spcAft>
+            <a:buNone/>
           </a:pPr>
           <a:r>
             <a:rPr lang="pt-BR" sz="1400" kern="1200" dirty="0"/>
@@ -2370,7 +2201,7 @@
         </a:bodyPr>
         <a:lstStyle/>
         <a:p>
-          <a:pPr lvl="0" algn="ctr" defTabSz="622300">
+          <a:pPr marL="0" lvl="0" indent="0" algn="ctr" defTabSz="622300">
             <a:lnSpc>
               <a:spcPct val="90000"/>
             </a:lnSpc>
@@ -2380,6 +2211,7 @@
             <a:spcAft>
               <a:spcPct val="35000"/>
             </a:spcAft>
+            <a:buNone/>
           </a:pPr>
           <a:r>
             <a:rPr lang="pt-BR" sz="1400" kern="1200" dirty="0"/>
@@ -2449,7 +2281,7 @@
         </a:bodyPr>
         <a:lstStyle/>
         <a:p>
-          <a:pPr lvl="0" algn="ctr" defTabSz="622300">
+          <a:pPr marL="0" lvl="0" indent="0" algn="ctr" defTabSz="622300">
             <a:lnSpc>
               <a:spcPct val="90000"/>
             </a:lnSpc>
@@ -2459,6 +2291,7 @@
             <a:spcAft>
               <a:spcPct val="35000"/>
             </a:spcAft>
+            <a:buNone/>
           </a:pPr>
           <a:r>
             <a:rPr lang="pt-BR" sz="1400" kern="1200" dirty="0"/>
@@ -2528,7 +2361,7 @@
         </a:bodyPr>
         <a:lstStyle/>
         <a:p>
-          <a:pPr lvl="0" algn="ctr" defTabSz="622300">
+          <a:pPr marL="0" lvl="0" indent="0" algn="ctr" defTabSz="622300">
             <a:lnSpc>
               <a:spcPct val="90000"/>
             </a:lnSpc>
@@ -2538,6 +2371,7 @@
             <a:spcAft>
               <a:spcPct val="35000"/>
             </a:spcAft>
+            <a:buNone/>
           </a:pPr>
           <a:r>
             <a:rPr lang="pt-BR" sz="1400" kern="1200" dirty="0"/>
@@ -2607,7 +2441,7 @@
         </a:bodyPr>
         <a:lstStyle/>
         <a:p>
-          <a:pPr lvl="0" algn="ctr" defTabSz="622300">
+          <a:pPr marL="0" lvl="0" indent="0" algn="ctr" defTabSz="622300">
             <a:lnSpc>
               <a:spcPct val="90000"/>
             </a:lnSpc>
@@ -2617,6 +2451,7 @@
             <a:spcAft>
               <a:spcPct val="35000"/>
             </a:spcAft>
+            <a:buNone/>
           </a:pPr>
           <a:r>
             <a:rPr lang="pt-BR" sz="1400" kern="1200" dirty="0"/>
@@ -2686,7 +2521,7 @@
         </a:bodyPr>
         <a:lstStyle/>
         <a:p>
-          <a:pPr lvl="0" algn="ctr" defTabSz="622300">
+          <a:pPr marL="0" lvl="0" indent="0" algn="ctr" defTabSz="622300">
             <a:lnSpc>
               <a:spcPct val="90000"/>
             </a:lnSpc>
@@ -2696,6 +2531,7 @@
             <a:spcAft>
               <a:spcPct val="35000"/>
             </a:spcAft>
+            <a:buNone/>
           </a:pPr>
           <a:r>
             <a:rPr lang="pt-BR" sz="1400" kern="1200" dirty="0"/>
@@ -2765,7 +2601,7 @@
         </a:bodyPr>
         <a:lstStyle/>
         <a:p>
-          <a:pPr lvl="0" algn="ctr" defTabSz="622300">
+          <a:pPr marL="0" lvl="0" indent="0" algn="ctr" defTabSz="622300">
             <a:lnSpc>
               <a:spcPct val="90000"/>
             </a:lnSpc>
@@ -2775,6 +2611,7 @@
             <a:spcAft>
               <a:spcPct val="35000"/>
             </a:spcAft>
+            <a:buNone/>
           </a:pPr>
           <a:r>
             <a:rPr lang="pt-BR" sz="1400" kern="1200" dirty="0"/>
@@ -2844,7 +2681,7 @@
         </a:bodyPr>
         <a:lstStyle/>
         <a:p>
-          <a:pPr lvl="0" algn="ctr" defTabSz="622300">
+          <a:pPr marL="0" lvl="0" indent="0" algn="ctr" defTabSz="622300">
             <a:lnSpc>
               <a:spcPct val="90000"/>
             </a:lnSpc>
@@ -2854,6 +2691,7 @@
             <a:spcAft>
               <a:spcPct val="35000"/>
             </a:spcAft>
+            <a:buNone/>
           </a:pPr>
           <a:r>
             <a:rPr lang="pt-BR" sz="1400" kern="1200" dirty="0"/>
@@ -2913,7 +2751,7 @@
         </a:bodyPr>
         <a:lstStyle/>
         <a:p>
-          <a:pPr lvl="0" algn="ctr" defTabSz="711200">
+          <a:pPr marL="0" lvl="0" indent="0" algn="ctr" defTabSz="711200">
             <a:lnSpc>
               <a:spcPct val="90000"/>
             </a:lnSpc>
@@ -2923,6 +2761,7 @@
             <a:spcAft>
               <a:spcPct val="35000"/>
             </a:spcAft>
+            <a:buNone/>
           </a:pPr>
           <a:r>
             <a:rPr lang="pt-BR" sz="1600" kern="1200" dirty="0"/>
@@ -2992,7 +2831,7 @@
         </a:bodyPr>
         <a:lstStyle/>
         <a:p>
-          <a:pPr lvl="0" algn="ctr" defTabSz="622300">
+          <a:pPr marL="0" lvl="0" indent="0" algn="ctr" defTabSz="622300">
             <a:lnSpc>
               <a:spcPct val="90000"/>
             </a:lnSpc>
@@ -3002,12 +2841,12 @@
             <a:spcAft>
               <a:spcPct val="35000"/>
             </a:spcAft>
+            <a:buNone/>
           </a:pPr>
           <a:r>
-            <a:rPr lang="pt-BR" sz="1400" kern="1200" dirty="0" smtClean="0"/>
+            <a:rPr lang="pt-BR" sz="1400" kern="1200" dirty="0"/>
             <a:t>Estação meteorológica</a:t>
           </a:r>
-          <a:endParaRPr lang="pt-BR" sz="1400" kern="1200" dirty="0"/>
         </a:p>
       </dsp:txBody>
       <dsp:txXfrm>
@@ -3062,7 +2901,7 @@
         </a:bodyPr>
         <a:lstStyle/>
         <a:p>
-          <a:pPr lvl="0" algn="ctr" defTabSz="711200">
+          <a:pPr marL="0" lvl="0" indent="0" algn="ctr" defTabSz="711200">
             <a:lnSpc>
               <a:spcPct val="90000"/>
             </a:lnSpc>
@@ -3072,6 +2911,7 @@
             <a:spcAft>
               <a:spcPct val="35000"/>
             </a:spcAft>
+            <a:buNone/>
           </a:pPr>
           <a:r>
             <a:rPr lang="pt-BR" sz="1600" kern="1200" dirty="0"/>
@@ -3141,7 +2981,7 @@
         </a:bodyPr>
         <a:lstStyle/>
         <a:p>
-          <a:pPr lvl="0" algn="ctr" defTabSz="622300">
+          <a:pPr marL="0" lvl="0" indent="0" algn="ctr" defTabSz="622300">
             <a:lnSpc>
               <a:spcPct val="90000"/>
             </a:lnSpc>
@@ -3151,12 +2991,12 @@
             <a:spcAft>
               <a:spcPct val="35000"/>
             </a:spcAft>
+            <a:buNone/>
           </a:pPr>
           <a:r>
-            <a:rPr lang="pt-BR" sz="1400" kern="1200" dirty="0" smtClean="0"/>
+            <a:rPr lang="pt-BR" sz="1400" kern="1200" dirty="0"/>
             <a:t>Projetos de Design de software</a:t>
           </a:r>
-          <a:endParaRPr lang="pt-BR" sz="1400" kern="1200" dirty="0"/>
         </a:p>
       </dsp:txBody>
       <dsp:txXfrm>
@@ -3211,7 +3051,7 @@
         </a:bodyPr>
         <a:lstStyle/>
         <a:p>
-          <a:pPr lvl="0" algn="ctr" defTabSz="711200">
+          <a:pPr marL="0" lvl="0" indent="0" algn="ctr" defTabSz="711200">
             <a:lnSpc>
               <a:spcPct val="90000"/>
             </a:lnSpc>
@@ -3221,6 +3061,7 @@
             <a:spcAft>
               <a:spcPct val="35000"/>
             </a:spcAft>
+            <a:buNone/>
           </a:pPr>
           <a:r>
             <a:rPr lang="pt-BR" sz="1600" kern="1200" dirty="0"/>
@@ -3290,7 +3131,7 @@
         </a:bodyPr>
         <a:lstStyle/>
         <a:p>
-          <a:pPr lvl="0" algn="ctr" defTabSz="622300">
+          <a:pPr marL="0" lvl="0" indent="0" algn="ctr" defTabSz="622300">
             <a:lnSpc>
               <a:spcPct val="90000"/>
             </a:lnSpc>
@@ -3300,11 +3141,12 @@
             <a:spcAft>
               <a:spcPct val="35000"/>
             </a:spcAft>
+            <a:buNone/>
           </a:pPr>
           <a:endParaRPr lang="pt-BR" sz="1400" kern="1200" dirty="0"/>
         </a:p>
         <a:p>
-          <a:pPr lvl="0" algn="ctr" defTabSz="622300">
+          <a:pPr marL="0" lvl="0" indent="0" algn="ctr" defTabSz="622300">
             <a:lnSpc>
               <a:spcPct val="90000"/>
             </a:lnSpc>
@@ -3314,12 +3156,12 @@
             <a:spcAft>
               <a:spcPct val="35000"/>
             </a:spcAft>
+            <a:buNone/>
           </a:pPr>
           <a:r>
-            <a:rPr lang="pt-BR" sz="1400" kern="1200" dirty="0" smtClean="0"/>
+            <a:rPr lang="pt-BR" sz="1400" kern="1200" dirty="0"/>
             <a:t>Projetos de Natureza do Design </a:t>
           </a:r>
-          <a:endParaRPr lang="pt-BR" sz="1400" kern="1200" dirty="0"/>
         </a:p>
       </dsp:txBody>
       <dsp:txXfrm>
@@ -3374,7 +3216,7 @@
         </a:bodyPr>
         <a:lstStyle/>
         <a:p>
-          <a:pPr lvl="0" algn="ctr" defTabSz="711200">
+          <a:pPr marL="0" lvl="0" indent="0" algn="ctr" defTabSz="711200">
             <a:lnSpc>
               <a:spcPct val="90000"/>
             </a:lnSpc>
@@ -3384,6 +3226,7 @@
             <a:spcAft>
               <a:spcPct val="35000"/>
             </a:spcAft>
+            <a:buNone/>
           </a:pPr>
           <a:r>
             <a:rPr lang="pt-BR" sz="1600" kern="1200" dirty="0"/>
@@ -3453,7 +3296,7 @@
         </a:bodyPr>
         <a:lstStyle/>
         <a:p>
-          <a:pPr lvl="0" algn="ctr" defTabSz="622300">
+          <a:pPr marL="0" lvl="0" indent="0" algn="ctr" defTabSz="622300">
             <a:lnSpc>
               <a:spcPct val="90000"/>
             </a:lnSpc>
@@ -3463,12 +3306,12 @@
             <a:spcAft>
               <a:spcPct val="35000"/>
             </a:spcAft>
+            <a:buNone/>
           </a:pPr>
           <a:r>
-            <a:rPr lang="pt-BR" sz="1400" kern="1200" dirty="0" smtClean="0"/>
+            <a:rPr lang="pt-BR" sz="1400" kern="1200" dirty="0"/>
             <a:t>Projetos de modelagem e simulação do mundo físico</a:t>
           </a:r>
-          <a:endParaRPr lang="pt-BR" sz="1400" kern="1200" dirty="0"/>
         </a:p>
       </dsp:txBody>
       <dsp:txXfrm>
@@ -4872,7 +4715,7 @@
           <a:p>
             <a:fld id="{DDD670B3-E2EA-4637-9A35-A3F69C814A4D}" type="datetimeFigureOut">
               <a:rPr lang="pt-BR" smtClean="0"/>
-              <a:t>21/08/17</a:t>
+              <a:t>22/08/2017</a:t>
             </a:fld>
             <a:endParaRPr lang="pt-BR"/>
           </a:p>
@@ -4914,7 +4757,7 @@
           <a:p>
             <a:fld id="{1589F13C-868A-4860-AF0B-B8654897AF81}" type="slidenum">
               <a:rPr lang="pt-BR" smtClean="0"/>
-              <a:t>‹#›</a:t>
+              <a:t>‹nº›</a:t>
             </a:fld>
             <a:endParaRPr lang="pt-BR"/>
           </a:p>
@@ -5086,7 +4929,7 @@
           <a:p>
             <a:fld id="{DDD670B3-E2EA-4637-9A35-A3F69C814A4D}" type="datetimeFigureOut">
               <a:rPr lang="pt-BR" smtClean="0"/>
-              <a:t>21/08/17</a:t>
+              <a:t>22/08/2017</a:t>
             </a:fld>
             <a:endParaRPr lang="pt-BR"/>
           </a:p>
@@ -5128,7 +4971,7 @@
           <a:p>
             <a:fld id="{1589F13C-868A-4860-AF0B-B8654897AF81}" type="slidenum">
               <a:rPr lang="pt-BR" smtClean="0"/>
-              <a:t>‹#›</a:t>
+              <a:t>‹nº›</a:t>
             </a:fld>
             <a:endParaRPr lang="pt-BR"/>
           </a:p>
@@ -5310,7 +5153,7 @@
           <a:p>
             <a:fld id="{DDD670B3-E2EA-4637-9A35-A3F69C814A4D}" type="datetimeFigureOut">
               <a:rPr lang="pt-BR" smtClean="0"/>
-              <a:t>21/08/17</a:t>
+              <a:t>22/08/2017</a:t>
             </a:fld>
             <a:endParaRPr lang="pt-BR"/>
           </a:p>
@@ -5352,7 +5195,7 @@
           <a:p>
             <a:fld id="{1589F13C-868A-4860-AF0B-B8654897AF81}" type="slidenum">
               <a:rPr lang="pt-BR" smtClean="0"/>
-              <a:t>‹#›</a:t>
+              <a:t>‹nº›</a:t>
             </a:fld>
             <a:endParaRPr lang="pt-BR"/>
           </a:p>
@@ -5524,7 +5367,7 @@
           <a:p>
             <a:fld id="{DDD670B3-E2EA-4637-9A35-A3F69C814A4D}" type="datetimeFigureOut">
               <a:rPr lang="pt-BR" smtClean="0"/>
-              <a:t>21/08/17</a:t>
+              <a:t>22/08/2017</a:t>
             </a:fld>
             <a:endParaRPr lang="pt-BR"/>
           </a:p>
@@ -5566,7 +5409,7 @@
           <a:p>
             <a:fld id="{1589F13C-868A-4860-AF0B-B8654897AF81}" type="slidenum">
               <a:rPr lang="pt-BR" smtClean="0"/>
-              <a:t>‹#›</a:t>
+              <a:t>‹nº›</a:t>
             </a:fld>
             <a:endParaRPr lang="pt-BR"/>
           </a:p>
@@ -5814,7 +5657,7 @@
           <a:p>
             <a:fld id="{DDD670B3-E2EA-4637-9A35-A3F69C814A4D}" type="datetimeFigureOut">
               <a:rPr lang="pt-BR" smtClean="0"/>
-              <a:t>21/08/17</a:t>
+              <a:t>22/08/2017</a:t>
             </a:fld>
             <a:endParaRPr lang="pt-BR"/>
           </a:p>
@@ -5856,7 +5699,7 @@
           <a:p>
             <a:fld id="{1589F13C-868A-4860-AF0B-B8654897AF81}" type="slidenum">
               <a:rPr lang="pt-BR" smtClean="0"/>
-              <a:t>‹#›</a:t>
+              <a:t>‹nº›</a:t>
             </a:fld>
             <a:endParaRPr lang="pt-BR"/>
           </a:p>
@@ -6090,7 +5933,7 @@
           <a:p>
             <a:fld id="{DDD670B3-E2EA-4637-9A35-A3F69C814A4D}" type="datetimeFigureOut">
               <a:rPr lang="pt-BR" smtClean="0"/>
-              <a:t>21/08/17</a:t>
+              <a:t>22/08/2017</a:t>
             </a:fld>
             <a:endParaRPr lang="pt-BR"/>
           </a:p>
@@ -6132,7 +5975,7 @@
           <a:p>
             <a:fld id="{1589F13C-868A-4860-AF0B-B8654897AF81}" type="slidenum">
               <a:rPr lang="pt-BR" smtClean="0"/>
-              <a:t>‹#›</a:t>
+              <a:t>‹nº›</a:t>
             </a:fld>
             <a:endParaRPr lang="pt-BR"/>
           </a:p>
@@ -6501,7 +6344,7 @@
           <a:p>
             <a:fld id="{DDD670B3-E2EA-4637-9A35-A3F69C814A4D}" type="datetimeFigureOut">
               <a:rPr lang="pt-BR" smtClean="0"/>
-              <a:t>21/08/17</a:t>
+              <a:t>22/08/2017</a:t>
             </a:fld>
             <a:endParaRPr lang="pt-BR"/>
           </a:p>
@@ -6543,7 +6386,7 @@
           <a:p>
             <a:fld id="{1589F13C-868A-4860-AF0B-B8654897AF81}" type="slidenum">
               <a:rPr lang="pt-BR" smtClean="0"/>
-              <a:t>‹#›</a:t>
+              <a:t>‹nº›</a:t>
             </a:fld>
             <a:endParaRPr lang="pt-BR"/>
           </a:p>
@@ -6663,7 +6506,7 @@
           <a:p>
             <a:fld id="{DDD670B3-E2EA-4637-9A35-A3F69C814A4D}" type="datetimeFigureOut">
               <a:rPr lang="pt-BR" smtClean="0"/>
-              <a:t>21/08/17</a:t>
+              <a:t>22/08/2017</a:t>
             </a:fld>
             <a:endParaRPr lang="pt-BR"/>
           </a:p>
@@ -6705,7 +6548,7 @@
           <a:p>
             <a:fld id="{1589F13C-868A-4860-AF0B-B8654897AF81}" type="slidenum">
               <a:rPr lang="pt-BR" smtClean="0"/>
-              <a:t>‹#›</a:t>
+              <a:t>‹nº›</a:t>
             </a:fld>
             <a:endParaRPr lang="pt-BR"/>
           </a:p>
@@ -6802,7 +6645,7 @@
           <a:p>
             <a:fld id="{DDD670B3-E2EA-4637-9A35-A3F69C814A4D}" type="datetimeFigureOut">
               <a:rPr lang="pt-BR" smtClean="0"/>
-              <a:t>21/08/17</a:t>
+              <a:t>22/08/2017</a:t>
             </a:fld>
             <a:endParaRPr lang="pt-BR"/>
           </a:p>
@@ -6844,7 +6687,7 @@
           <a:p>
             <a:fld id="{1589F13C-868A-4860-AF0B-B8654897AF81}" type="slidenum">
               <a:rPr lang="pt-BR" smtClean="0"/>
-              <a:t>‹#›</a:t>
+              <a:t>‹nº›</a:t>
             </a:fld>
             <a:endParaRPr lang="pt-BR"/>
           </a:p>
@@ -7123,7 +6966,7 @@
           <a:p>
             <a:fld id="{DDD670B3-E2EA-4637-9A35-A3F69C814A4D}" type="datetimeFigureOut">
               <a:rPr lang="pt-BR" smtClean="0"/>
-              <a:t>21/08/17</a:t>
+              <a:t>22/08/2017</a:t>
             </a:fld>
             <a:endParaRPr lang="pt-BR"/>
           </a:p>
@@ -7165,7 +7008,7 @@
           <a:p>
             <a:fld id="{1589F13C-868A-4860-AF0B-B8654897AF81}" type="slidenum">
               <a:rPr lang="pt-BR" smtClean="0"/>
-              <a:t>‹#›</a:t>
+              <a:t>‹nº›</a:t>
             </a:fld>
             <a:endParaRPr lang="pt-BR"/>
           </a:p>
@@ -7424,7 +7267,7 @@
           <a:p>
             <a:fld id="{DDD670B3-E2EA-4637-9A35-A3F69C814A4D}" type="datetimeFigureOut">
               <a:rPr lang="pt-BR" smtClean="0"/>
-              <a:t>21/08/17</a:t>
+              <a:t>22/08/2017</a:t>
             </a:fld>
             <a:endParaRPr lang="pt-BR"/>
           </a:p>
@@ -7466,7 +7309,7 @@
           <a:p>
             <a:fld id="{1589F13C-868A-4860-AF0B-B8654897AF81}" type="slidenum">
               <a:rPr lang="pt-BR" smtClean="0"/>
-              <a:t>‹#›</a:t>
+              <a:t>‹nº›</a:t>
             </a:fld>
             <a:endParaRPr lang="pt-BR"/>
           </a:p>
@@ -7681,7 +7524,7 @@
           <a:p>
             <a:fld id="{DDD670B3-E2EA-4637-9A35-A3F69C814A4D}" type="datetimeFigureOut">
               <a:rPr lang="pt-BR" smtClean="0"/>
-              <a:t>21/08/17</a:t>
+              <a:t>22/08/2017</a:t>
             </a:fld>
             <a:endParaRPr lang="pt-BR"/>
           </a:p>
@@ -7759,7 +7602,7 @@
           <a:p>
             <a:fld id="{1589F13C-868A-4860-AF0B-B8654897AF81}" type="slidenum">
               <a:rPr lang="pt-BR" smtClean="0"/>
-              <a:t>‹#›</a:t>
+              <a:t>‹nº›</a:t>
             </a:fld>
             <a:endParaRPr lang="pt-BR"/>
           </a:p>
@@ -8183,10 +8026,9 @@
           <a:lstStyle/>
           <a:p>
             <a:r>
-              <a:rPr lang="pt-BR" sz="2800" dirty="0" smtClean="0"/>
+              <a:rPr lang="pt-BR" sz="2800" dirty="0"/>
               <a:t>3ªComputação </a:t>
             </a:r>
-            <a:endParaRPr lang="pt-BR" sz="2800" dirty="0"/>
           </a:p>
         </p:txBody>
       </p:sp>
@@ -8269,7 +8111,7 @@
               <a:defRPr/>
             </a:pPr>
             <a:r>
-              <a:rPr lang="pt-BR" sz="3600" dirty="0" smtClean="0"/>
+              <a:rPr lang="pt-BR" sz="3600" dirty="0"/>
               <a:t>Sim</a:t>
             </a:r>
           </a:p>
@@ -8299,10 +8141,9 @@
               <a:defRPr/>
             </a:pPr>
             <a:r>
-              <a:rPr lang="pt-BR" sz="3600" dirty="0" smtClean="0"/>
+              <a:rPr lang="pt-BR" sz="3600" dirty="0"/>
               <a:t>Sim</a:t>
             </a:r>
-            <a:endParaRPr lang="pt-BR" sz="3600" dirty="0"/>
           </a:p>
           <a:p>
             <a:pPr marL="285750" indent="-285750" defTabSz="914400"/>
@@ -8330,7 +8171,7 @@
               <a:defRPr/>
             </a:pPr>
             <a:r>
-              <a:rPr lang="pt-BR" sz="3600" dirty="0" smtClean="0"/>
+              <a:rPr lang="pt-BR" sz="3600" dirty="0"/>
               <a:t>1 mês</a:t>
             </a:r>
           </a:p>
@@ -8352,7 +8193,7 @@
               <a:tabLst/>
               <a:defRPr/>
             </a:pPr>
-            <a:endParaRPr lang="pt-BR" sz="3600" dirty="0" smtClean="0"/>
+            <a:endParaRPr lang="pt-BR" sz="3600" dirty="0"/>
           </a:p>
           <a:p>
             <a:pPr marL="285750" marR="0" lvl="0" indent="-285750" defTabSz="914400" eaLnBrk="1" fontAlgn="auto" latinLnBrk="0" hangingPunct="1">
@@ -8428,6 +8269,50 @@
       </p:grpSpPr>
       <p:sp>
         <p:nvSpPr>
+          <p:cNvPr id="13" name="Retângulo 12">
+            <a:extLst>
+              <a:ext uri="{FF2B5EF4-FFF2-40B4-BE49-F238E27FC236}">
+                <a16:creationId xmlns:a16="http://schemas.microsoft.com/office/drawing/2014/main" id="{478F0A13-B634-464B-B789-25C27D5A3C40}"/>
+              </a:ext>
+            </a:extLst>
+          </p:cNvPr>
+          <p:cNvSpPr/>
+          <p:nvPr/>
+        </p:nvSpPr>
+        <p:spPr>
+          <a:xfrm>
+            <a:off x="266700" y="1277443"/>
+            <a:ext cx="11633200" cy="5363200"/>
+          </a:xfrm>
+          <a:prstGeom prst="rect">
+            <a:avLst/>
+          </a:prstGeom>
+        </p:spPr>
+        <p:style>
+          <a:lnRef idx="2">
+            <a:schemeClr val="dk1"/>
+          </a:lnRef>
+          <a:fillRef idx="1">
+            <a:schemeClr val="lt1"/>
+          </a:fillRef>
+          <a:effectRef idx="0">
+            <a:schemeClr val="dk1"/>
+          </a:effectRef>
+          <a:fontRef idx="minor">
+            <a:schemeClr val="dk1"/>
+          </a:fontRef>
+        </p:style>
+        <p:txBody>
+          <a:bodyPr rtlCol="0" anchor="ctr"/>
+          <a:lstStyle/>
+          <a:p>
+            <a:pPr algn="ctr"/>
+            <a:endParaRPr lang="pt-BR"/>
+          </a:p>
+        </p:txBody>
+      </p:sp>
+      <p:sp>
+        <p:nvSpPr>
           <p:cNvPr id="2" name="Título 1"/>
           <p:cNvSpPr>
             <a:spLocks noGrp="1"/>
@@ -8518,119 +8403,358 @@
           </a:p>
         </p:txBody>
       </p:sp>
-      <p:sp>
-        <p:nvSpPr>
-          <p:cNvPr id="5" name="Retângulo: Cantos Arredondados 4"/>
-          <p:cNvSpPr/>
+      <p:cxnSp>
+        <p:nvCxnSpPr>
+          <p:cNvPr id="8" name="Conector reto 7">
+            <a:extLst>
+              <a:ext uri="{FF2B5EF4-FFF2-40B4-BE49-F238E27FC236}">
+                <a16:creationId xmlns:a16="http://schemas.microsoft.com/office/drawing/2014/main" id="{F65276AE-2215-404E-A643-823A67E8F035}"/>
+              </a:ext>
+            </a:extLst>
+          </p:cNvPr>
+          <p:cNvCxnSpPr>
+            <a:cxnSpLocks/>
+          </p:cNvCxnSpPr>
           <p:nvPr/>
-        </p:nvSpPr>
+        </p:nvCxnSpPr>
         <p:spPr>
           <a:xfrm>
-            <a:off x="469900" y="1252032"/>
-            <a:ext cx="11252200" cy="5384800"/>
+            <a:off x="279400" y="2570922"/>
+            <a:ext cx="11620500" cy="0"/>
           </a:xfrm>
-          <a:prstGeom prst="roundRect">
+          <a:prstGeom prst="line">
             <a:avLst/>
           </a:prstGeom>
         </p:spPr>
         <p:style>
           <a:lnRef idx="2">
-            <a:schemeClr val="accent1">
-              <a:shade val="50000"/>
-            </a:schemeClr>
+            <a:schemeClr val="dk1"/>
           </a:lnRef>
-          <a:fillRef idx="1">
-            <a:schemeClr val="accent1"/>
+          <a:fillRef idx="0">
+            <a:schemeClr val="dk1"/>
           </a:fillRef>
-          <a:effectRef idx="0">
-            <a:schemeClr val="accent1"/>
+          <a:effectRef idx="1">
+            <a:schemeClr val="dk1"/>
           </a:effectRef>
           <a:fontRef idx="minor">
-            <a:schemeClr val="lt1"/>
+            <a:schemeClr val="tx1"/>
           </a:fontRef>
         </p:style>
-        <p:txBody>
-          <a:bodyPr rtlCol="0" anchor="ctr"/>
+      </p:cxnSp>
+      <p:pic>
+        <p:nvPicPr>
+          <p:cNvPr id="1026" name="Picture 2" descr="Resultado de imagem para insper">
+            <a:extLst>
+              <a:ext uri="{FF2B5EF4-FFF2-40B4-BE49-F238E27FC236}">
+                <a16:creationId xmlns:a16="http://schemas.microsoft.com/office/drawing/2014/main" id="{5B75599E-41C9-43B7-A6AE-D71337E09284}"/>
+              </a:ext>
+            </a:extLst>
+          </p:cNvPr>
+          <p:cNvPicPr>
+            <a:picLocks noChangeAspect="1" noChangeArrowheads="1"/>
+          </p:cNvPicPr>
+          <p:nvPr/>
+        </p:nvPicPr>
+        <p:blipFill>
+          <a:blip r:embed="rId2">
+            <a:extLst>
+              <a:ext uri="{28A0092B-C50C-407E-A947-70E740481C1C}">
+                <a14:useLocalDpi xmlns:a14="http://schemas.microsoft.com/office/drawing/2010/main" val="0"/>
+              </a:ext>
+            </a:extLst>
+          </a:blip>
+          <a:srcRect/>
+          <a:stretch>
+            <a:fillRect/>
+          </a:stretch>
+        </p:blipFill>
+        <p:spPr bwMode="auto">
+          <a:xfrm>
+            <a:off x="10162043" y="1682875"/>
+            <a:ext cx="1562314" cy="550799"/>
+          </a:xfrm>
+          <a:prstGeom prst="rect">
+            <a:avLst/>
+          </a:prstGeom>
+          <a:noFill/>
+          <a:extLst>
+            <a:ext uri="{909E8E84-426E-40DD-AFC4-6F175D3DCCD1}">
+              <a14:hiddenFill xmlns:a14="http://schemas.microsoft.com/office/drawing/2010/main">
+                <a:solidFill>
+                  <a:srgbClr val="FFFFFF"/>
+                </a:solidFill>
+              </a14:hiddenFill>
+            </a:ext>
+          </a:extLst>
+        </p:spPr>
+      </p:pic>
+      <p:sp>
+        <p:nvSpPr>
+          <p:cNvPr id="10" name="CaixaDeTexto 9">
+            <a:extLst>
+              <a:ext uri="{FF2B5EF4-FFF2-40B4-BE49-F238E27FC236}">
+                <a16:creationId xmlns:a16="http://schemas.microsoft.com/office/drawing/2014/main" id="{DBA1B89E-6C36-4102-B50C-1D5D17270259}"/>
+              </a:ext>
+            </a:extLst>
+          </p:cNvPr>
+          <p:cNvSpPr txBox="1"/>
+          <p:nvPr/>
+        </p:nvSpPr>
+        <p:spPr>
+          <a:xfrm>
+            <a:off x="749252" y="2899957"/>
+            <a:ext cx="10975105" cy="369332"/>
+          </a:xfrm>
+          <a:prstGeom prst="rect">
+            <a:avLst/>
+          </a:prstGeom>
+          <a:noFill/>
+        </p:spPr>
+        <p:txBody>
+          <a:bodyPr wrap="square" rtlCol="0">
+            <a:spAutoFit/>
+          </a:bodyPr>
           <a:lstStyle/>
           <a:p>
-            <a:pPr algn="ctr"/>
-            <a:r>
-              <a:rPr lang="pt-BR" sz="3600" dirty="0" smtClean="0"/>
+            <a:r>
+              <a:rPr lang="pt-BR" u="sng" dirty="0">
+                <a:solidFill>
+                  <a:schemeClr val="accent1">
+                    <a:lumMod val="75000"/>
+                  </a:schemeClr>
+                </a:solidFill>
+              </a:rPr>
               <a:t>Sobre mim</a:t>
             </a:r>
-          </a:p>
-          <a:p>
-            <a:r>
-              <a:rPr lang="pt-BR" sz="3600" dirty="0" smtClean="0"/>
-              <a:t>Curso:</a:t>
-            </a:r>
-          </a:p>
-          <a:p>
-            <a:r>
-              <a:rPr lang="pt-BR" sz="3600" dirty="0" err="1" smtClean="0"/>
-              <a:t>Eng</a:t>
-            </a:r>
-            <a:r>
-              <a:rPr lang="pt-BR" sz="3600" dirty="0"/>
+            <a:r>
+              <a:rPr lang="pt-BR" dirty="0">
+                <a:solidFill>
+                  <a:schemeClr val="accent1">
+                    <a:lumMod val="75000"/>
+                  </a:schemeClr>
+                </a:solidFill>
+              </a:rPr>
+              <a:t> – </a:t>
+            </a:r>
+            <a:r>
+              <a:rPr lang="pt-BR" dirty="0"/>
+              <a:t>Veja aqui nossa história e como e porque chegamos aqui</a:t>
+            </a:r>
+            <a:r>
+              <a:rPr lang="pt-BR" u="sng" dirty="0">
+                <a:solidFill>
+                  <a:schemeClr val="accent1">
+                    <a:lumMod val="75000"/>
+                  </a:schemeClr>
+                </a:solidFill>
+              </a:rPr>
+              <a:t>  </a:t>
+            </a:r>
+          </a:p>
+        </p:txBody>
+      </p:sp>
+      <p:sp>
+        <p:nvSpPr>
+          <p:cNvPr id="11" name="CaixaDeTexto 10">
+            <a:extLst>
+              <a:ext uri="{FF2B5EF4-FFF2-40B4-BE49-F238E27FC236}">
+                <a16:creationId xmlns:a16="http://schemas.microsoft.com/office/drawing/2014/main" id="{6D93B4C8-75E2-4E57-A5A8-63B29354A6F2}"/>
+              </a:ext>
+            </a:extLst>
+          </p:cNvPr>
+          <p:cNvSpPr txBox="1"/>
+          <p:nvPr/>
+        </p:nvSpPr>
+        <p:spPr>
+          <a:xfrm>
+            <a:off x="749252" y="1435674"/>
+            <a:ext cx="8209218" cy="1107996"/>
+          </a:xfrm>
+          <a:prstGeom prst="rect">
+            <a:avLst/>
+          </a:prstGeom>
+          <a:noFill/>
+        </p:spPr>
+        <p:txBody>
+          <a:bodyPr wrap="square" rtlCol="0">
+            <a:spAutoFit/>
+          </a:bodyPr>
+          <a:lstStyle/>
+          <a:p>
+            <a:r>
+              <a:rPr lang="pt-BR" sz="6600" dirty="0">
+                <a:latin typeface="Baskerville Old Face" panose="02020602080505020303" pitchFamily="18" charset="0"/>
+              </a:rPr>
+              <a:t>J.L inc. </a:t>
+            </a:r>
+            <a:r>
+              <a:rPr lang="pt-BR" sz="5400" dirty="0">
+                <a:latin typeface="Baskerville Old Face" panose="02020602080505020303" pitchFamily="18" charset="0"/>
+              </a:rPr>
+              <a:t>- projetos da vida</a:t>
+            </a:r>
+            <a:endParaRPr lang="pt-BR" dirty="0">
+              <a:latin typeface="Baskerville Old Face" panose="02020602080505020303" pitchFamily="18" charset="0"/>
+            </a:endParaRPr>
+          </a:p>
+        </p:txBody>
+      </p:sp>
+      <p:sp>
+        <p:nvSpPr>
+          <p:cNvPr id="12" name="CaixaDeTexto 11">
+            <a:extLst>
+              <a:ext uri="{FF2B5EF4-FFF2-40B4-BE49-F238E27FC236}">
+                <a16:creationId xmlns:a16="http://schemas.microsoft.com/office/drawing/2014/main" id="{7A8A5AEE-5E99-4950-9969-B718EA084E80}"/>
+              </a:ext>
+            </a:extLst>
+          </p:cNvPr>
+          <p:cNvSpPr txBox="1"/>
+          <p:nvPr/>
+        </p:nvSpPr>
+        <p:spPr>
+          <a:xfrm>
+            <a:off x="749252" y="3314776"/>
+            <a:ext cx="7061246" cy="369332"/>
+          </a:xfrm>
+          <a:prstGeom prst="rect">
+            <a:avLst/>
+          </a:prstGeom>
+          <a:noFill/>
+        </p:spPr>
+        <p:txBody>
+          <a:bodyPr wrap="square" rtlCol="0">
+            <a:spAutoFit/>
+          </a:bodyPr>
+          <a:lstStyle/>
+          <a:p>
+            <a:r>
+              <a:rPr lang="pt-BR" u="sng" dirty="0">
+                <a:solidFill>
+                  <a:schemeClr val="accent1">
+                    <a:lumMod val="75000"/>
+                  </a:schemeClr>
+                </a:solidFill>
+              </a:rPr>
+              <a:t>Projetos</a:t>
+            </a:r>
+            <a:r>
+              <a:rPr lang="pt-BR" dirty="0">
+                <a:solidFill>
+                  <a:schemeClr val="accent1">
+                    <a:lumMod val="75000"/>
+                  </a:schemeClr>
+                </a:solidFill>
+              </a:rPr>
               <a:t> </a:t>
             </a:r>
             <a:r>
-              <a:rPr lang="pt-BR" sz="3600" dirty="0" err="1" smtClean="0"/>
-              <a:t>Comp</a:t>
-            </a:r>
-            <a:endParaRPr lang="pt-BR" sz="3600" dirty="0"/>
-          </a:p>
-          <a:p>
-            <a:r>
-              <a:rPr lang="pt-BR" sz="3600" dirty="0" smtClean="0"/>
-              <a:t>Semestre:</a:t>
-            </a:r>
-          </a:p>
-          <a:p>
-            <a:r>
-              <a:rPr lang="pt-BR" sz="3600" dirty="0"/>
-              <a:t>2</a:t>
-            </a:r>
-          </a:p>
-          <a:p>
-            <a:r>
-              <a:rPr lang="pt-BR" sz="3600" dirty="0" smtClean="0"/>
-              <a:t>Sala:</a:t>
-            </a:r>
-          </a:p>
-          <a:p>
-            <a:r>
-              <a:rPr lang="pt-BR" sz="3600" dirty="0"/>
-              <a:t>C</a:t>
-            </a:r>
-          </a:p>
-          <a:p>
-            <a:r>
-              <a:rPr lang="pt-BR" sz="3600" dirty="0" smtClean="0"/>
-              <a:t>Gostos:</a:t>
-            </a:r>
-          </a:p>
-          <a:p>
-            <a:r>
-              <a:rPr lang="pt-BR" sz="3600" dirty="0" err="1" smtClean="0"/>
-              <a:t>Matemática,Física</a:t>
-            </a:r>
-            <a:r>
-              <a:rPr lang="pt-BR" sz="3600" dirty="0" smtClean="0"/>
-              <a:t> </a:t>
-            </a:r>
-            <a:r>
-              <a:rPr lang="pt-BR" sz="3600" smtClean="0"/>
-              <a:t>e Videogames</a:t>
-            </a:r>
-            <a:endParaRPr lang="pt-BR" sz="3600" dirty="0"/>
-          </a:p>
-          <a:p>
-            <a:pPr algn="ctr"/>
-            <a:endParaRPr lang="pt-BR" sz="3600" dirty="0"/>
-          </a:p>
-        </p:txBody>
-      </p:sp>
+              <a:rPr lang="pt-BR" dirty="0"/>
+              <a:t>– Veja aqui os projetos que fizemos em semestres passados</a:t>
+            </a:r>
+            <a:endParaRPr lang="pt-BR" u="sng" dirty="0">
+              <a:solidFill>
+                <a:schemeClr val="accent1">
+                  <a:lumMod val="75000"/>
+                </a:schemeClr>
+              </a:solidFill>
+            </a:endParaRPr>
+          </a:p>
+        </p:txBody>
+      </p:sp>
+      <p:pic>
+        <p:nvPicPr>
+          <p:cNvPr id="1028" name="Picture 4" descr="Resultado de imagem para fab lab insper">
+            <a:extLst>
+              <a:ext uri="{FF2B5EF4-FFF2-40B4-BE49-F238E27FC236}">
+                <a16:creationId xmlns:a16="http://schemas.microsoft.com/office/drawing/2014/main" id="{14BB0DDB-512F-498F-97E5-0D1B64CF5C24}"/>
+              </a:ext>
+            </a:extLst>
+          </p:cNvPr>
+          <p:cNvPicPr>
+            <a:picLocks noChangeAspect="1" noChangeArrowheads="1"/>
+          </p:cNvPicPr>
+          <p:nvPr/>
+        </p:nvPicPr>
+        <p:blipFill>
+          <a:blip r:embed="rId3">
+            <a:extLst>
+              <a:ext uri="{28A0092B-C50C-407E-A947-70E740481C1C}">
+                <a14:useLocalDpi xmlns:a14="http://schemas.microsoft.com/office/drawing/2010/main" val="0"/>
+              </a:ext>
+            </a:extLst>
+          </a:blip>
+          <a:srcRect/>
+          <a:stretch>
+            <a:fillRect/>
+          </a:stretch>
+        </p:blipFill>
+        <p:spPr bwMode="auto">
+          <a:xfrm>
+            <a:off x="7280877" y="3837149"/>
+            <a:ext cx="4246667" cy="2648858"/>
+          </a:xfrm>
+          <a:prstGeom prst="rect">
+            <a:avLst/>
+          </a:prstGeom>
+          <a:noFill/>
+          <a:extLst>
+            <a:ext uri="{909E8E84-426E-40DD-AFC4-6F175D3DCCD1}">
+              <a14:hiddenFill xmlns:a14="http://schemas.microsoft.com/office/drawing/2010/main">
+                <a:solidFill>
+                  <a:srgbClr val="FFFFFF"/>
+                </a:solidFill>
+              </a14:hiddenFill>
+            </a:ext>
+          </a:extLst>
+        </p:spPr>
+      </p:pic>
+      <p:pic>
+        <p:nvPicPr>
+          <p:cNvPr id="1030" name="Picture 6" descr="Resultado de imagem para fab lab insper">
+            <a:extLst>
+              <a:ext uri="{FF2B5EF4-FFF2-40B4-BE49-F238E27FC236}">
+                <a16:creationId xmlns:a16="http://schemas.microsoft.com/office/drawing/2014/main" id="{3EDE2F17-A24B-41EA-87A8-B0988FF97934}"/>
+              </a:ext>
+            </a:extLst>
+          </p:cNvPr>
+          <p:cNvPicPr>
+            <a:picLocks noChangeAspect="1" noChangeArrowheads="1"/>
+          </p:cNvPicPr>
+          <p:nvPr/>
+        </p:nvPicPr>
+        <p:blipFill>
+          <a:blip r:embed="rId4">
+            <a:extLst>
+              <a:ext uri="{28A0092B-C50C-407E-A947-70E740481C1C}">
+                <a14:useLocalDpi xmlns:a14="http://schemas.microsoft.com/office/drawing/2010/main" val="0"/>
+              </a:ext>
+            </a:extLst>
+          </a:blip>
+          <a:srcRect/>
+          <a:stretch>
+            <a:fillRect/>
+          </a:stretch>
+        </p:blipFill>
+        <p:spPr bwMode="auto">
+          <a:xfrm>
+            <a:off x="1517936" y="3837149"/>
+            <a:ext cx="4747952" cy="2648858"/>
+          </a:xfrm>
+          <a:prstGeom prst="rect">
+            <a:avLst/>
+          </a:prstGeom>
+          <a:noFill/>
+          <a:extLst>
+            <a:ext uri="{909E8E84-426E-40DD-AFC4-6F175D3DCCD1}">
+              <a14:hiddenFill xmlns:a14="http://schemas.microsoft.com/office/drawing/2010/main">
+                <a:solidFill>
+                  <a:srgbClr val="FFFFFF"/>
+                </a:solidFill>
+              </a14:hiddenFill>
+            </a:ext>
+          </a:extLst>
+        </p:spPr>
+      </p:pic>
     </p:spTree>
     <p:extLst>
       <p:ext uri="{BB962C8B-B14F-4D97-AF65-F5344CB8AC3E}">
@@ -8692,52 +8816,37 @@
       </p:sp>
       <p:sp>
         <p:nvSpPr>
-          <p:cNvPr id="4" name="Espaço Reservado para Conteúdo 3"/>
-          <p:cNvSpPr>
-            <a:spLocks noGrp="1"/>
-          </p:cNvSpPr>
-          <p:nvPr>
-            <p:ph idx="1"/>
-          </p:nvPr>
-        </p:nvSpPr>
-        <p:spPr/>
-        <p:txBody>
-          <a:bodyPr/>
-          <a:lstStyle/>
-          <a:p>
-            <a:endParaRPr lang="pt-BR"/>
-          </a:p>
-        </p:txBody>
-      </p:sp>
-      <p:sp>
-        <p:nvSpPr>
-          <p:cNvPr id="5" name="Retângulo: Cantos Arredondados 4"/>
+          <p:cNvPr id="9" name="Retângulo 8">
+            <a:extLst>
+              <a:ext uri="{FF2B5EF4-FFF2-40B4-BE49-F238E27FC236}">
+                <a16:creationId xmlns:a16="http://schemas.microsoft.com/office/drawing/2014/main" id="{385EB44B-80D8-4AD9-9E76-8BA4B9BA6445}"/>
+              </a:ext>
+            </a:extLst>
+          </p:cNvPr>
           <p:cNvSpPr/>
           <p:nvPr/>
         </p:nvSpPr>
         <p:spPr>
           <a:xfrm>
-            <a:off x="469900" y="939800"/>
-            <a:ext cx="11252200" cy="5384800"/>
+            <a:off x="266700" y="1277443"/>
+            <a:ext cx="11633200" cy="5363200"/>
           </a:xfrm>
-          <a:prstGeom prst="roundRect">
+          <a:prstGeom prst="rect">
             <a:avLst/>
           </a:prstGeom>
         </p:spPr>
         <p:style>
           <a:lnRef idx="2">
-            <a:schemeClr val="accent1">
-              <a:shade val="50000"/>
-            </a:schemeClr>
+            <a:schemeClr val="dk1"/>
           </a:lnRef>
           <a:fillRef idx="1">
-            <a:schemeClr val="accent1"/>
+            <a:schemeClr val="lt1"/>
           </a:fillRef>
           <a:effectRef idx="0">
-            <a:schemeClr val="accent1"/>
+            <a:schemeClr val="dk1"/>
           </a:effectRef>
           <a:fontRef idx="minor">
-            <a:schemeClr val="lt1"/>
+            <a:schemeClr val="dk1"/>
           </a:fontRef>
         </p:style>
         <p:txBody>
@@ -8745,13 +8854,218 @@
           <a:lstStyle/>
           <a:p>
             <a:pPr algn="ctr"/>
-            <a:r>
-              <a:rPr lang="pt-BR" sz="3600" dirty="0"/>
-              <a:t>Desenhe sua página “Sobre mim” AQUI!</a:t>
-            </a:r>
-          </a:p>
-        </p:txBody>
-      </p:sp>
+            <a:endParaRPr lang="pt-BR" dirty="0"/>
+          </a:p>
+        </p:txBody>
+      </p:sp>
+      <p:cxnSp>
+        <p:nvCxnSpPr>
+          <p:cNvPr id="10" name="Conector reto 9">
+            <a:extLst>
+              <a:ext uri="{FF2B5EF4-FFF2-40B4-BE49-F238E27FC236}">
+                <a16:creationId xmlns:a16="http://schemas.microsoft.com/office/drawing/2014/main" id="{5C6F632C-EC73-4ED7-9233-C60A5E70F3E4}"/>
+              </a:ext>
+            </a:extLst>
+          </p:cNvPr>
+          <p:cNvCxnSpPr>
+            <a:cxnSpLocks/>
+          </p:cNvCxnSpPr>
+          <p:nvPr/>
+        </p:nvCxnSpPr>
+        <p:spPr>
+          <a:xfrm>
+            <a:off x="279400" y="2570922"/>
+            <a:ext cx="11620500" cy="0"/>
+          </a:xfrm>
+          <a:prstGeom prst="line">
+            <a:avLst/>
+          </a:prstGeom>
+        </p:spPr>
+        <p:style>
+          <a:lnRef idx="2">
+            <a:schemeClr val="dk1"/>
+          </a:lnRef>
+          <a:fillRef idx="0">
+            <a:schemeClr val="dk1"/>
+          </a:fillRef>
+          <a:effectRef idx="1">
+            <a:schemeClr val="dk1"/>
+          </a:effectRef>
+          <a:fontRef idx="minor">
+            <a:schemeClr val="tx1"/>
+          </a:fontRef>
+        </p:style>
+      </p:cxnSp>
+      <p:pic>
+        <p:nvPicPr>
+          <p:cNvPr id="11" name="Picture 2" descr="Resultado de imagem para insper">
+            <a:extLst>
+              <a:ext uri="{FF2B5EF4-FFF2-40B4-BE49-F238E27FC236}">
+                <a16:creationId xmlns:a16="http://schemas.microsoft.com/office/drawing/2014/main" id="{476318BC-9043-4A62-AE49-053C81338660}"/>
+              </a:ext>
+            </a:extLst>
+          </p:cNvPr>
+          <p:cNvPicPr>
+            <a:picLocks noChangeAspect="1" noChangeArrowheads="1"/>
+          </p:cNvPicPr>
+          <p:nvPr/>
+        </p:nvPicPr>
+        <p:blipFill>
+          <a:blip r:embed="rId2">
+            <a:extLst>
+              <a:ext uri="{28A0092B-C50C-407E-A947-70E740481C1C}">
+                <a14:useLocalDpi xmlns:a14="http://schemas.microsoft.com/office/drawing/2010/main" val="0"/>
+              </a:ext>
+            </a:extLst>
+          </a:blip>
+          <a:srcRect/>
+          <a:stretch>
+            <a:fillRect/>
+          </a:stretch>
+        </p:blipFill>
+        <p:spPr bwMode="auto">
+          <a:xfrm>
+            <a:off x="10162043" y="1682875"/>
+            <a:ext cx="1562314" cy="550799"/>
+          </a:xfrm>
+          <a:prstGeom prst="rect">
+            <a:avLst/>
+          </a:prstGeom>
+          <a:noFill/>
+          <a:extLst>
+            <a:ext uri="{909E8E84-426E-40DD-AFC4-6F175D3DCCD1}">
+              <a14:hiddenFill xmlns:a14="http://schemas.microsoft.com/office/drawing/2010/main">
+                <a:solidFill>
+                  <a:srgbClr val="FFFFFF"/>
+                </a:solidFill>
+              </a14:hiddenFill>
+            </a:ext>
+          </a:extLst>
+        </p:spPr>
+      </p:pic>
+      <p:sp>
+        <p:nvSpPr>
+          <p:cNvPr id="13" name="CaixaDeTexto 12">
+            <a:extLst>
+              <a:ext uri="{FF2B5EF4-FFF2-40B4-BE49-F238E27FC236}">
+                <a16:creationId xmlns:a16="http://schemas.microsoft.com/office/drawing/2014/main" id="{FFB4A829-2A04-41AF-8D29-FF438FD3F6F5}"/>
+              </a:ext>
+            </a:extLst>
+          </p:cNvPr>
+          <p:cNvSpPr txBox="1"/>
+          <p:nvPr/>
+        </p:nvSpPr>
+        <p:spPr>
+          <a:xfrm>
+            <a:off x="749252" y="1435674"/>
+            <a:ext cx="8209218" cy="1107996"/>
+          </a:xfrm>
+          <a:prstGeom prst="rect">
+            <a:avLst/>
+          </a:prstGeom>
+          <a:noFill/>
+        </p:spPr>
+        <p:txBody>
+          <a:bodyPr wrap="square" rtlCol="0">
+            <a:spAutoFit/>
+          </a:bodyPr>
+          <a:lstStyle/>
+          <a:p>
+            <a:r>
+              <a:rPr lang="pt-BR" sz="6600" dirty="0">
+                <a:latin typeface="Baskerville Old Face" panose="02020602080505020303" pitchFamily="18" charset="0"/>
+              </a:rPr>
+              <a:t>Sobre nós</a:t>
+            </a:r>
+            <a:endParaRPr lang="pt-BR" dirty="0">
+              <a:latin typeface="Baskerville Old Face" panose="02020602080505020303" pitchFamily="18" charset="0"/>
+            </a:endParaRPr>
+          </a:p>
+        </p:txBody>
+      </p:sp>
+      <p:sp>
+        <p:nvSpPr>
+          <p:cNvPr id="17" name="CaixaDeTexto 16">
+            <a:extLst>
+              <a:ext uri="{FF2B5EF4-FFF2-40B4-BE49-F238E27FC236}">
+                <a16:creationId xmlns:a16="http://schemas.microsoft.com/office/drawing/2014/main" id="{ED70C3CD-FD73-465A-89B9-CC94B040D45E}"/>
+              </a:ext>
+            </a:extLst>
+          </p:cNvPr>
+          <p:cNvSpPr txBox="1"/>
+          <p:nvPr/>
+        </p:nvSpPr>
+        <p:spPr>
+          <a:xfrm>
+            <a:off x="719827" y="2713810"/>
+            <a:ext cx="4804673" cy="3737946"/>
+          </a:xfrm>
+          <a:prstGeom prst="rect">
+            <a:avLst/>
+          </a:prstGeom>
+          <a:noFill/>
+        </p:spPr>
+        <p:txBody>
+          <a:bodyPr wrap="square" rtlCol="0">
+            <a:spAutoFit/>
+          </a:bodyPr>
+          <a:lstStyle/>
+          <a:p>
+            <a:pPr>
+              <a:lnSpc>
+                <a:spcPct val="150000"/>
+              </a:lnSpc>
+            </a:pPr>
+            <a:r>
+              <a:rPr lang="pt-BR" sz="2000" dirty="0"/>
+              <a:t>Somos um grupo de estudantes de engenharia no Instituto de Pesquisa </a:t>
+            </a:r>
+            <a:r>
+              <a:rPr lang="pt-BR" sz="2000" dirty="0" err="1"/>
+              <a:t>Insper</a:t>
+            </a:r>
+            <a:r>
+              <a:rPr lang="pt-BR" sz="2000" dirty="0"/>
+              <a:t>. Temos como principal foco a inovação tecnológica no ramo da computação, mecatrônica e mecânica. Para isso, temos o aprendizado baseado em projetos práticos como podem acessar na pagina inicial. Grato a todos os internautas!</a:t>
+            </a:r>
+          </a:p>
+        </p:txBody>
+      </p:sp>
+      <p:pic>
+        <p:nvPicPr>
+          <p:cNvPr id="18" name="Imagem 17" descr="Uma imagem contendo pessoa, chão, interior, grupo&#10;&#10;Descrição gerada com muito alta confiança">
+            <a:extLst>
+              <a:ext uri="{FF2B5EF4-FFF2-40B4-BE49-F238E27FC236}">
+                <a16:creationId xmlns:a16="http://schemas.microsoft.com/office/drawing/2014/main" id="{249FBD33-0424-4FD7-BD0C-99007F10B19F}"/>
+              </a:ext>
+            </a:extLst>
+          </p:cNvPr>
+          <p:cNvPicPr>
+            <a:picLocks noChangeAspect="1"/>
+          </p:cNvPicPr>
+          <p:nvPr/>
+        </p:nvPicPr>
+        <p:blipFill rotWithShape="1">
+          <a:blip r:embed="rId3">
+            <a:extLst>
+              <a:ext uri="{28A0092B-C50C-407E-A947-70E740481C1C}">
+                <a14:useLocalDpi xmlns:a14="http://schemas.microsoft.com/office/drawing/2010/main" val="0"/>
+              </a:ext>
+            </a:extLst>
+          </a:blip>
+          <a:srcRect t="13197" b="12018"/>
+          <a:stretch/>
+        </p:blipFill>
+        <p:spPr>
+          <a:xfrm>
+            <a:off x="7219806" y="2596399"/>
+            <a:ext cx="2984787" cy="4044244"/>
+          </a:xfrm>
+          <a:prstGeom prst="rect">
+            <a:avLst/>
+          </a:prstGeom>
+        </p:spPr>
+      </p:pic>
     </p:spTree>
     <p:extLst>
       <p:ext uri="{BB962C8B-B14F-4D97-AF65-F5344CB8AC3E}">
@@ -8872,7 +9186,7 @@
           <p:cNvPr id="3" name="Imagem 2" descr="Uma imagem contendo pessoa, chão, interior, grupo&#10;&#10;Descrição gerada com muito alta confiança">
             <a:extLst>
               <a:ext uri="{FF2B5EF4-FFF2-40B4-BE49-F238E27FC236}">
-                <a16:creationId xmlns:a16="http://schemas.microsoft.com/office/drawing/2014/main" xmlns="" id="{5AD09A87-BA23-4AFB-8BBD-183984808ED9}"/>
+                <a16:creationId xmlns:a16="http://schemas.microsoft.com/office/drawing/2014/main" id="{5AD09A87-BA23-4AFB-8BBD-183984808ED9}"/>
               </a:ext>
             </a:extLst>
           </p:cNvPr>
@@ -9306,26 +9620,25 @@
               <a:buChar char="•"/>
             </a:pPr>
             <a:r>
-              <a:rPr lang="pt-BR" sz="1600" dirty="0" smtClean="0"/>
+              <a:rPr lang="pt-BR" sz="1600" dirty="0"/>
               <a:t> Um entusiasta em eletrônica está gostando de construir protótipos com </a:t>
             </a:r>
             <a:r>
-              <a:rPr lang="pt-BR" sz="1600" dirty="0" err="1" smtClean="0"/>
+              <a:rPr lang="pt-BR" sz="1600" dirty="0" err="1"/>
               <a:t>Arduino</a:t>
             </a:r>
             <a:r>
-              <a:rPr lang="pt-BR" sz="1600" dirty="0" smtClean="0"/>
+              <a:rPr lang="pt-BR" sz="1600" dirty="0"/>
               <a:t> e quer começar a ir além da </a:t>
             </a:r>
             <a:r>
-              <a:rPr lang="pt-BR" sz="1600" dirty="0" err="1" smtClean="0"/>
+              <a:rPr lang="pt-BR" sz="1600" dirty="0" err="1"/>
               <a:t>protoboard</a:t>
             </a:r>
             <a:r>
-              <a:rPr lang="pt-BR" sz="1600" dirty="0" smtClean="0"/>
+              <a:rPr lang="pt-BR" sz="1600" dirty="0"/>
               <a:t>. Ele ouviu falar da sua Estação Meteorológica e gostaria de utilizá-la como referência para dar os primeiros passos em PCB.</a:t>
             </a:r>
-            <a:endParaRPr lang="pt-BR" sz="1600" dirty="0"/>
           </a:p>
           <a:p>
             <a:pPr marL="285750" indent="-285750">
@@ -9464,82 +9777,81 @@
           <a:p>
             <a:pPr algn="ctr"/>
             <a:r>
-              <a:rPr lang="pt-BR" sz="3600" dirty="0" smtClean="0"/>
+              <a:rPr lang="pt-BR" sz="3600" dirty="0"/>
               <a:t>Computação: Projetos de </a:t>
             </a:r>
             <a:r>
-              <a:rPr lang="pt-BR" sz="3600" dirty="0" err="1" smtClean="0"/>
+              <a:rPr lang="pt-BR" sz="3600" dirty="0" err="1"/>
               <a:t>Dsoft</a:t>
             </a:r>
             <a:r>
-              <a:rPr lang="pt-BR" sz="3600" dirty="0" smtClean="0"/>
+              <a:rPr lang="pt-BR" sz="3600" dirty="0"/>
               <a:t> (</a:t>
             </a:r>
             <a:r>
-              <a:rPr lang="pt-BR" sz="3600" dirty="0" err="1" smtClean="0"/>
+              <a:rPr lang="pt-BR" sz="3600" dirty="0" err="1"/>
               <a:t>Pokemon</a:t>
             </a:r>
             <a:r>
-              <a:rPr lang="pt-BR" sz="3600" dirty="0" smtClean="0"/>
+              <a:rPr lang="pt-BR" sz="3600" dirty="0"/>
               <a:t>/Viking/</a:t>
             </a:r>
             <a:r>
-              <a:rPr lang="pt-BR" sz="3600" dirty="0" err="1" smtClean="0"/>
+              <a:rPr lang="pt-BR" sz="3600" dirty="0" err="1"/>
               <a:t>Poker</a:t>
             </a:r>
             <a:r>
-              <a:rPr lang="pt-BR" sz="3600" dirty="0" smtClean="0"/>
+              <a:rPr lang="pt-BR" sz="3600" dirty="0"/>
               <a:t>)</a:t>
             </a:r>
           </a:p>
           <a:p>
             <a:pPr algn="ctr"/>
             <a:r>
-              <a:rPr lang="pt-BR" sz="3600" dirty="0" smtClean="0"/>
+              <a:rPr lang="pt-BR" sz="3600" dirty="0"/>
               <a:t>Trabalhos Sociais: Artigo e Cases de GDE</a:t>
             </a:r>
           </a:p>
           <a:p>
             <a:pPr algn="ctr"/>
             <a:r>
-              <a:rPr lang="pt-BR" sz="3600" dirty="0" smtClean="0"/>
+              <a:rPr lang="pt-BR" sz="3600" dirty="0"/>
               <a:t>Eletrônica: Estação Meteorológica</a:t>
             </a:r>
           </a:p>
           <a:p>
             <a:pPr algn="ctr"/>
             <a:r>
-              <a:rPr lang="pt-BR" sz="3600" dirty="0" smtClean="0"/>
+              <a:rPr lang="pt-BR" sz="3600" dirty="0"/>
               <a:t>Aplicação Prática: Projetos de </a:t>
             </a:r>
             <a:r>
-              <a:rPr lang="pt-BR" sz="3600" dirty="0" err="1" smtClean="0"/>
+              <a:rPr lang="pt-BR" sz="3600" dirty="0" err="1"/>
               <a:t>ModSim</a:t>
             </a:r>
             <a:r>
-              <a:rPr lang="pt-BR" sz="3600" dirty="0" smtClean="0"/>
+              <a:rPr lang="pt-BR" sz="3600" dirty="0"/>
               <a:t> (mão na massa!)</a:t>
             </a:r>
           </a:p>
           <a:p>
             <a:pPr algn="ctr"/>
             <a:r>
-              <a:rPr lang="pt-BR" sz="3600" dirty="0" smtClean="0"/>
+              <a:rPr lang="pt-BR" sz="3600" dirty="0"/>
               <a:t>Concepção de Projetos: Processo de criação do brinquedo em </a:t>
             </a:r>
             <a:r>
-              <a:rPr lang="pt-BR" sz="3600" dirty="0" err="1" smtClean="0"/>
+              <a:rPr lang="pt-BR" sz="3600" dirty="0" err="1"/>
               <a:t>NatDes</a:t>
             </a:r>
             <a:r>
-              <a:rPr lang="pt-BR" sz="3600" dirty="0" smtClean="0"/>
+              <a:rPr lang="pt-BR" sz="3600" dirty="0"/>
               <a:t> </a:t>
             </a:r>
-            <a:endParaRPr lang="pt-BR" sz="3600" dirty="0" smtClean="0"/>
           </a:p>
           <a:p>
             <a:pPr algn="ctr"/>
-            <a:endParaRPr lang="pt-BR" sz="3600" dirty="0" smtClean="0"/>
+            <a:endParaRPr lang="pt-BR" sz="3600" dirty="0"/>
           </a:p>
         </p:txBody>
       </p:sp>
@@ -10201,13 +10513,8 @@
           <a:p>
             <a:r>
               <a:rPr lang="pt-BR" sz="2800" dirty="0"/>
-              <a:t>3ª </a:t>
-            </a:r>
-            <a:r>
-              <a:rPr lang="pt-BR" sz="2800" dirty="0" smtClean="0"/>
-              <a:t>Modelagem</a:t>
-            </a:r>
-            <a:endParaRPr lang="pt-BR" sz="2800" dirty="0"/>
+              <a:t>3ª Modelagem</a:t>
+            </a:r>
           </a:p>
         </p:txBody>
       </p:sp>
@@ -10271,11 +10578,7 @@
             </a:pPr>
             <a:r>
               <a:rPr lang="pt-BR" sz="3600" dirty="0"/>
-              <a:t>O projeto envolveu software</a:t>
-            </a:r>
-            <a:r>
-              <a:rPr lang="pt-BR" sz="3600" dirty="0" smtClean="0"/>
-              <a:t>?</a:t>
+              <a:t>O projeto envolveu software?</a:t>
             </a:r>
           </a:p>
           <a:p>
@@ -10284,10 +10587,9 @@
               <a:buChar char="•"/>
             </a:pPr>
             <a:r>
-              <a:rPr lang="pt-BR" sz="3600" dirty="0" smtClean="0"/>
+              <a:rPr lang="pt-BR" sz="3600" dirty="0"/>
               <a:t>Sim</a:t>
             </a:r>
-            <a:endParaRPr lang="pt-BR" sz="3600" dirty="0"/>
           </a:p>
           <a:p>
             <a:pPr marL="285750" indent="-285750">
@@ -10305,7 +10607,7 @@
               <a:buChar char="•"/>
             </a:pPr>
             <a:r>
-              <a:rPr lang="pt-BR" sz="3600" dirty="0" smtClean="0"/>
+              <a:rPr lang="pt-BR" sz="3600" dirty="0"/>
               <a:t>Sim</a:t>
             </a:r>
           </a:p>
@@ -10315,7 +10617,7 @@
               <a:buChar char="•"/>
             </a:pPr>
             <a:r>
-              <a:rPr lang="pt-BR" sz="3600" dirty="0" smtClean="0"/>
+              <a:rPr lang="pt-BR" sz="3600" dirty="0"/>
               <a:t>O projeto envolveu conhecimentos de física?</a:t>
             </a:r>
           </a:p>
@@ -10325,7 +10627,7 @@
               <a:buChar char="•"/>
             </a:pPr>
             <a:r>
-              <a:rPr lang="pt-BR" sz="3600" dirty="0" smtClean="0"/>
+              <a:rPr lang="pt-BR" sz="3600" dirty="0"/>
               <a:t>Sim</a:t>
             </a:r>
           </a:p>

</xml_diff>